<commit_message>
Adds changes from Zwischenbericht to Powerpoint
</commit_message>
<xml_diff>
--- a/Documents/Decimal Datentyp in IML.pptx
+++ b/Documents/Decimal Datentyp in IML.pptx
@@ -5,34 +5,35 @@
     <p:sldMasterId id="2147483713" r:id="rId1"/>
   </p:sldMasterIdLst>
   <p:notesMasterIdLst>
-    <p:notesMasterId r:id="rId10"/>
+    <p:notesMasterId r:id="rId11"/>
   </p:notesMasterIdLst>
   <p:handoutMasterIdLst>
-    <p:handoutMasterId r:id="rId11"/>
+    <p:handoutMasterId r:id="rId12"/>
   </p:handoutMasterIdLst>
   <p:sldIdLst>
     <p:sldId id="256" r:id="rId2"/>
-    <p:sldId id="257" r:id="rId3"/>
-    <p:sldId id="258" r:id="rId4"/>
-    <p:sldId id="259" r:id="rId5"/>
-    <p:sldId id="260" r:id="rId6"/>
-    <p:sldId id="261" r:id="rId7"/>
-    <p:sldId id="263" r:id="rId8"/>
-    <p:sldId id="262" r:id="rId9"/>
+    <p:sldId id="264" r:id="rId3"/>
+    <p:sldId id="257" r:id="rId4"/>
+    <p:sldId id="258" r:id="rId5"/>
+    <p:sldId id="259" r:id="rId6"/>
+    <p:sldId id="260" r:id="rId7"/>
+    <p:sldId id="261" r:id="rId8"/>
+    <p:sldId id="263" r:id="rId9"/>
+    <p:sldId id="262" r:id="rId10"/>
   </p:sldIdLst>
   <p:sldSz cx="10693400" cy="7561263"/>
   <p:notesSz cx="6858000" cy="9144000"/>
   <p:embeddedFontLst>
     <p:embeddedFont>
-      <p:font typeface="Inconsolata" panose="020B0604020202020204" charset="0"/>
-      <p:regular r:id="rId12"/>
+      <p:font typeface="Inconsolata" panose="020B0609030003000000" pitchFamily="50" charset="0"/>
+      <p:regular r:id="rId13"/>
     </p:embeddedFont>
     <p:embeddedFont>
       <p:font typeface="Calibri" panose="020F0502020204030204" pitchFamily="34" charset="0"/>
-      <p:regular r:id="rId13"/>
-      <p:bold r:id="rId14"/>
-      <p:italic r:id="rId15"/>
-      <p:boldItalic r:id="rId16"/>
+      <p:regular r:id="rId14"/>
+      <p:bold r:id="rId15"/>
+      <p:italic r:id="rId16"/>
+      <p:boldItalic r:id="rId17"/>
     </p:embeddedFont>
   </p:embeddedFontLst>
   <p:defaultTextStyle>
@@ -232,14 +233,14 @@
           <a:effectLst/>
           <a:extLst>
             <a:ext uri="{909E8E84-426E-40dd-AFC4-6F175D3DCCD1}">
-              <a14:hiddenFill xmlns="" xmlns:a14="http://schemas.microsoft.com/office/drawing/2010/main">
+              <a14:hiddenFill xmlns:a14="http://schemas.microsoft.com/office/drawing/2010/main" xmlns="">
                 <a:solidFill>
                   <a:schemeClr val="accent1"/>
                 </a:solidFill>
               </a14:hiddenFill>
             </a:ext>
             <a:ext uri="{91240B29-F687-4f45-9708-019B960494DF}">
-              <a14:hiddenLine xmlns="" xmlns:a14="http://schemas.microsoft.com/office/drawing/2010/main" w="9525">
+              <a14:hiddenLine xmlns:a14="http://schemas.microsoft.com/office/drawing/2010/main" xmlns="" w="9525">
                 <a:solidFill>
                   <a:schemeClr val="tx1"/>
                 </a:solidFill>
@@ -249,7 +250,7 @@
               </a14:hiddenLine>
             </a:ext>
             <a:ext uri="{AF507438-7753-43e0-B8FC-AC1667EBCBE1}">
-              <a14:hiddenEffects xmlns="" xmlns:a14="http://schemas.microsoft.com/office/drawing/2010/main">
+              <a14:hiddenEffects xmlns:a14="http://schemas.microsoft.com/office/drawing/2010/main" xmlns="">
                 <a:effectLst>
                   <a:outerShdw dist="35921" dir="2700000" algn="ctr" rotWithShape="0">
                     <a:schemeClr val="bg2"/>
@@ -300,14 +301,14 @@
           <a:effectLst/>
           <a:extLst>
             <a:ext uri="{909E8E84-426E-40dd-AFC4-6F175D3DCCD1}">
-              <a14:hiddenFill xmlns="" xmlns:a14="http://schemas.microsoft.com/office/drawing/2010/main">
+              <a14:hiddenFill xmlns:a14="http://schemas.microsoft.com/office/drawing/2010/main" xmlns="">
                 <a:solidFill>
                   <a:schemeClr val="accent1"/>
                 </a:solidFill>
               </a14:hiddenFill>
             </a:ext>
             <a:ext uri="{91240B29-F687-4f45-9708-019B960494DF}">
-              <a14:hiddenLine xmlns="" xmlns:a14="http://schemas.microsoft.com/office/drawing/2010/main" w="9525">
+              <a14:hiddenLine xmlns:a14="http://schemas.microsoft.com/office/drawing/2010/main" xmlns="" w="9525">
                 <a:solidFill>
                   <a:schemeClr val="tx1"/>
                 </a:solidFill>
@@ -317,7 +318,7 @@
               </a14:hiddenLine>
             </a:ext>
             <a:ext uri="{AF507438-7753-43e0-B8FC-AC1667EBCBE1}">
-              <a14:hiddenEffects xmlns="" xmlns:a14="http://schemas.microsoft.com/office/drawing/2010/main">
+              <a14:hiddenEffects xmlns:a14="http://schemas.microsoft.com/office/drawing/2010/main" xmlns="">
                 <a:effectLst>
                   <a:outerShdw dist="35921" dir="2700000" algn="ctr" rotWithShape="0">
                     <a:schemeClr val="bg2"/>
@@ -368,14 +369,14 @@
           <a:effectLst/>
           <a:extLst>
             <a:ext uri="{909E8E84-426E-40dd-AFC4-6F175D3DCCD1}">
-              <a14:hiddenFill xmlns="" xmlns:a14="http://schemas.microsoft.com/office/drawing/2010/main">
+              <a14:hiddenFill xmlns:a14="http://schemas.microsoft.com/office/drawing/2010/main" xmlns="">
                 <a:solidFill>
                   <a:schemeClr val="accent1"/>
                 </a:solidFill>
               </a14:hiddenFill>
             </a:ext>
             <a:ext uri="{91240B29-F687-4f45-9708-019B960494DF}">
-              <a14:hiddenLine xmlns="" xmlns:a14="http://schemas.microsoft.com/office/drawing/2010/main" w="9525">
+              <a14:hiddenLine xmlns:a14="http://schemas.microsoft.com/office/drawing/2010/main" xmlns="" w="9525">
                 <a:solidFill>
                   <a:schemeClr val="tx1"/>
                 </a:solidFill>
@@ -385,7 +386,7 @@
               </a14:hiddenLine>
             </a:ext>
             <a:ext uri="{AF507438-7753-43e0-B8FC-AC1667EBCBE1}">
-              <a14:hiddenEffects xmlns="" xmlns:a14="http://schemas.microsoft.com/office/drawing/2010/main">
+              <a14:hiddenEffects xmlns:a14="http://schemas.microsoft.com/office/drawing/2010/main" xmlns="">
                 <a:effectLst>
                   <a:outerShdw dist="35921" dir="2700000" algn="ctr" rotWithShape="0">
                     <a:schemeClr val="bg2"/>
@@ -436,14 +437,14 @@
           <a:effectLst/>
           <a:extLst>
             <a:ext uri="{909E8E84-426E-40dd-AFC4-6F175D3DCCD1}">
-              <a14:hiddenFill xmlns="" xmlns:a14="http://schemas.microsoft.com/office/drawing/2010/main">
+              <a14:hiddenFill xmlns:a14="http://schemas.microsoft.com/office/drawing/2010/main" xmlns="">
                 <a:solidFill>
                   <a:schemeClr val="accent1"/>
                 </a:solidFill>
               </a14:hiddenFill>
             </a:ext>
             <a:ext uri="{91240B29-F687-4f45-9708-019B960494DF}">
-              <a14:hiddenLine xmlns="" xmlns:a14="http://schemas.microsoft.com/office/drawing/2010/main" w="9525">
+              <a14:hiddenLine xmlns:a14="http://schemas.microsoft.com/office/drawing/2010/main" xmlns="" w="9525">
                 <a:solidFill>
                   <a:schemeClr val="tx1"/>
                 </a:solidFill>
@@ -453,7 +454,7 @@
               </a14:hiddenLine>
             </a:ext>
             <a:ext uri="{AF507438-7753-43e0-B8FC-AC1667EBCBE1}">
-              <a14:hiddenEffects xmlns="" xmlns:a14="http://schemas.microsoft.com/office/drawing/2010/main">
+              <a14:hiddenEffects xmlns:a14="http://schemas.microsoft.com/office/drawing/2010/main" xmlns="">
                 <a:effectLst>
                   <a:outerShdw dist="35921" dir="2700000" algn="ctr" rotWithShape="0">
                     <a:schemeClr val="bg2"/>
@@ -478,7 +479,7 @@
             <a:fld id="{C74B13BA-36C6-4300-B5B6-6C1D152DFF13}" type="slidenum">
               <a:rPr lang="de-CH"/>
               <a:pPr/>
-              <a:t>‹Nr.›</a:t>
+              <a:t>‹#›</a:t>
             </a:fld>
             <a:endParaRPr lang="de-CH"/>
           </a:p>
@@ -545,14 +546,14 @@
           <a:effectLst/>
           <a:extLst>
             <a:ext uri="{909E8E84-426E-40dd-AFC4-6F175D3DCCD1}">
-              <a14:hiddenFill xmlns="" xmlns:a14="http://schemas.microsoft.com/office/drawing/2010/main">
+              <a14:hiddenFill xmlns:a14="http://schemas.microsoft.com/office/drawing/2010/main" xmlns="">
                 <a:solidFill>
                   <a:schemeClr val="accent1"/>
                 </a:solidFill>
               </a14:hiddenFill>
             </a:ext>
             <a:ext uri="{91240B29-F687-4f45-9708-019B960494DF}">
-              <a14:hiddenLine xmlns="" xmlns:a14="http://schemas.microsoft.com/office/drawing/2010/main" w="9525">
+              <a14:hiddenLine xmlns:a14="http://schemas.microsoft.com/office/drawing/2010/main" xmlns="" w="9525">
                 <a:solidFill>
                   <a:schemeClr val="tx1"/>
                 </a:solidFill>
@@ -562,7 +563,7 @@
               </a14:hiddenLine>
             </a:ext>
             <a:ext uri="{AF507438-7753-43e0-B8FC-AC1667EBCBE1}">
-              <a14:hiddenEffects xmlns="" xmlns:a14="http://schemas.microsoft.com/office/drawing/2010/main">
+              <a14:hiddenEffects xmlns:a14="http://schemas.microsoft.com/office/drawing/2010/main" xmlns="">
                 <a:effectLst>
                   <a:outerShdw dist="35921" dir="2700000" algn="ctr" rotWithShape="0">
                     <a:schemeClr val="bg2"/>
@@ -613,14 +614,14 @@
           <a:effectLst/>
           <a:extLst>
             <a:ext uri="{909E8E84-426E-40dd-AFC4-6F175D3DCCD1}">
-              <a14:hiddenFill xmlns="" xmlns:a14="http://schemas.microsoft.com/office/drawing/2010/main">
+              <a14:hiddenFill xmlns:a14="http://schemas.microsoft.com/office/drawing/2010/main" xmlns="">
                 <a:solidFill>
                   <a:schemeClr val="accent1"/>
                 </a:solidFill>
               </a14:hiddenFill>
             </a:ext>
             <a:ext uri="{91240B29-F687-4f45-9708-019B960494DF}">
-              <a14:hiddenLine xmlns="" xmlns:a14="http://schemas.microsoft.com/office/drawing/2010/main" w="9525">
+              <a14:hiddenLine xmlns:a14="http://schemas.microsoft.com/office/drawing/2010/main" xmlns="" w="9525">
                 <a:solidFill>
                   <a:schemeClr val="tx1"/>
                 </a:solidFill>
@@ -630,7 +631,7 @@
               </a14:hiddenLine>
             </a:ext>
             <a:ext uri="{AF507438-7753-43e0-B8FC-AC1667EBCBE1}">
-              <a14:hiddenEffects xmlns="" xmlns:a14="http://schemas.microsoft.com/office/drawing/2010/main">
+              <a14:hiddenEffects xmlns:a14="http://schemas.microsoft.com/office/drawing/2010/main" xmlns="">
                 <a:effectLst>
                   <a:outerShdw dist="35921" dir="2700000" algn="ctr" rotWithShape="0">
                     <a:schemeClr val="bg2"/>
@@ -686,7 +687,7 @@
           <a:effectLst/>
           <a:extLst>
             <a:ext uri="{AF507438-7753-43e0-B8FC-AC1667EBCBE1}">
-              <a14:hiddenEffects xmlns="" xmlns:a14="http://schemas.microsoft.com/office/drawing/2010/main">
+              <a14:hiddenEffects xmlns:a14="http://schemas.microsoft.com/office/drawing/2010/main" xmlns="">
                 <a:effectLst>
                   <a:outerShdw dist="35921" dir="2700000" algn="ctr" rotWithShape="0">
                     <a:srgbClr val="808080"/>
@@ -695,7 +696,7 @@
               </a14:hiddenEffects>
             </a:ext>
             <a:ext uri="{53640926-AAD7-44d8-BBD7-CCE9431645EC}">
-              <a14:shadowObscured xmlns="" xmlns:a14="http://schemas.microsoft.com/office/drawing/2010/main" val="1"/>
+              <a14:shadowObscured xmlns:a14="http://schemas.microsoft.com/office/drawing/2010/main" xmlns="" val="1"/>
             </a:ext>
           </a:extLst>
         </p:spPr>
@@ -725,14 +726,14 @@
           <a:effectLst/>
           <a:extLst>
             <a:ext uri="{909E8E84-426E-40dd-AFC4-6F175D3DCCD1}">
-              <a14:hiddenFill xmlns="" xmlns:a14="http://schemas.microsoft.com/office/drawing/2010/main">
+              <a14:hiddenFill xmlns:a14="http://schemas.microsoft.com/office/drawing/2010/main" xmlns="">
                 <a:solidFill>
                   <a:schemeClr val="accent1"/>
                 </a:solidFill>
               </a14:hiddenFill>
             </a:ext>
             <a:ext uri="{91240B29-F687-4f45-9708-019B960494DF}">
-              <a14:hiddenLine xmlns="" xmlns:a14="http://schemas.microsoft.com/office/drawing/2010/main" w="9525">
+              <a14:hiddenLine xmlns:a14="http://schemas.microsoft.com/office/drawing/2010/main" xmlns="" w="9525">
                 <a:solidFill>
                   <a:schemeClr val="tx1"/>
                 </a:solidFill>
@@ -742,7 +743,7 @@
               </a14:hiddenLine>
             </a:ext>
             <a:ext uri="{AF507438-7753-43e0-B8FC-AC1667EBCBE1}">
-              <a14:hiddenEffects xmlns="" xmlns:a14="http://schemas.microsoft.com/office/drawing/2010/main">
+              <a14:hiddenEffects xmlns:a14="http://schemas.microsoft.com/office/drawing/2010/main" xmlns="">
                 <a:effectLst>
                   <a:outerShdw dist="35921" dir="2700000" algn="ctr" rotWithShape="0">
                     <a:schemeClr val="bg2"/>
@@ -821,14 +822,14 @@
           <a:effectLst/>
           <a:extLst>
             <a:ext uri="{909E8E84-426E-40dd-AFC4-6F175D3DCCD1}">
-              <a14:hiddenFill xmlns="" xmlns:a14="http://schemas.microsoft.com/office/drawing/2010/main">
+              <a14:hiddenFill xmlns:a14="http://schemas.microsoft.com/office/drawing/2010/main" xmlns="">
                 <a:solidFill>
                   <a:schemeClr val="accent1"/>
                 </a:solidFill>
               </a14:hiddenFill>
             </a:ext>
             <a:ext uri="{91240B29-F687-4f45-9708-019B960494DF}">
-              <a14:hiddenLine xmlns="" xmlns:a14="http://schemas.microsoft.com/office/drawing/2010/main" w="9525">
+              <a14:hiddenLine xmlns:a14="http://schemas.microsoft.com/office/drawing/2010/main" xmlns="" w="9525">
                 <a:solidFill>
                   <a:schemeClr val="tx1"/>
                 </a:solidFill>
@@ -838,7 +839,7 @@
               </a14:hiddenLine>
             </a:ext>
             <a:ext uri="{AF507438-7753-43e0-B8FC-AC1667EBCBE1}">
-              <a14:hiddenEffects xmlns="" xmlns:a14="http://schemas.microsoft.com/office/drawing/2010/main">
+              <a14:hiddenEffects xmlns:a14="http://schemas.microsoft.com/office/drawing/2010/main" xmlns="">
                 <a:effectLst>
                   <a:outerShdw dist="35921" dir="2700000" algn="ctr" rotWithShape="0">
                     <a:schemeClr val="bg2"/>
@@ -889,14 +890,14 @@
           <a:effectLst/>
           <a:extLst>
             <a:ext uri="{909E8E84-426E-40dd-AFC4-6F175D3DCCD1}">
-              <a14:hiddenFill xmlns="" xmlns:a14="http://schemas.microsoft.com/office/drawing/2010/main">
+              <a14:hiddenFill xmlns:a14="http://schemas.microsoft.com/office/drawing/2010/main" xmlns="">
                 <a:solidFill>
                   <a:schemeClr val="accent1"/>
                 </a:solidFill>
               </a14:hiddenFill>
             </a:ext>
             <a:ext uri="{91240B29-F687-4f45-9708-019B960494DF}">
-              <a14:hiddenLine xmlns="" xmlns:a14="http://schemas.microsoft.com/office/drawing/2010/main" w="9525">
+              <a14:hiddenLine xmlns:a14="http://schemas.microsoft.com/office/drawing/2010/main" xmlns="" w="9525">
                 <a:solidFill>
                   <a:schemeClr val="tx1"/>
                 </a:solidFill>
@@ -906,7 +907,7 @@
               </a14:hiddenLine>
             </a:ext>
             <a:ext uri="{AF507438-7753-43e0-B8FC-AC1667EBCBE1}">
-              <a14:hiddenEffects xmlns="" xmlns:a14="http://schemas.microsoft.com/office/drawing/2010/main">
+              <a14:hiddenEffects xmlns:a14="http://schemas.microsoft.com/office/drawing/2010/main" xmlns="">
                 <a:effectLst>
                   <a:outerShdw dist="35921" dir="2700000" algn="ctr" rotWithShape="0">
                     <a:schemeClr val="bg2"/>
@@ -931,7 +932,7 @@
             <a:fld id="{058061DB-DF71-4765-99A4-14E22DF63CCF}" type="slidenum">
               <a:rPr lang="de-CH"/>
               <a:pPr/>
-              <a:t>‹Nr.›</a:t>
+              <a:t>‹#›</a:t>
             </a:fld>
             <a:endParaRPr lang="de-CH"/>
           </a:p>
@@ -1070,6 +1071,107 @@
 </p:notesMaster>
 </file>
 
+<file path=ppt/notesSlides/notesSlide1.xml><?xml version="1.0" encoding="utf-8"?>
+<p:notes xmlns:a="http://schemas.openxmlformats.org/drawingml/2006/main" xmlns:r="http://schemas.openxmlformats.org/officeDocument/2006/relationships" xmlns:p="http://schemas.openxmlformats.org/presentationml/2006/main">
+  <p:cSld>
+    <p:spTree>
+      <p:nvGrpSpPr>
+        <p:cNvPr id="1" name=""/>
+        <p:cNvGrpSpPr/>
+        <p:nvPr/>
+      </p:nvGrpSpPr>
+      <p:grpSpPr>
+        <a:xfrm>
+          <a:off x="0" y="0"/>
+          <a:ext cx="0" cy="0"/>
+          <a:chOff x="0" y="0"/>
+          <a:chExt cx="0" cy="0"/>
+        </a:xfrm>
+      </p:grpSpPr>
+      <p:sp>
+        <p:nvSpPr>
+          <p:cNvPr id="2" name="Slide Image Placeholder 1"/>
+          <p:cNvSpPr>
+            <a:spLocks noGrp="1" noRot="1" noChangeAspect="1"/>
+          </p:cNvSpPr>
+          <p:nvPr>
+            <p:ph type="sldImg"/>
+          </p:nvPr>
+        </p:nvSpPr>
+        <p:spPr/>
+      </p:sp>
+      <p:sp>
+        <p:nvSpPr>
+          <p:cNvPr id="3" name="Notes Placeholder 2"/>
+          <p:cNvSpPr>
+            <a:spLocks noGrp="1"/>
+          </p:cNvSpPr>
+          <p:nvPr>
+            <p:ph type="body" idx="1"/>
+          </p:nvPr>
+        </p:nvSpPr>
+        <p:spPr/>
+        <p:txBody>
+          <a:bodyPr/>
+          <a:lstStyle/>
+          <a:p>
+            <a:r>
+              <a:rPr lang="de-CH" dirty="0" smtClean="0"/>
+              <a:t>Nicht alle Bit verwendet für symmetrische Repräsentation (10^-28 bis 10^28</a:t>
+            </a:r>
+            <a:r>
+              <a:rPr lang="de-CH" baseline="0" dirty="0" smtClean="0"/>
+              <a:t> immer mit </a:t>
+            </a:r>
+            <a:r>
+              <a:rPr lang="de-CH" baseline="0" smtClean="0"/>
+              <a:t>28 Stellen</a:t>
+            </a:r>
+            <a:r>
+              <a:rPr lang="de-CH" smtClean="0"/>
+              <a:t>)</a:t>
+            </a:r>
+            <a:endParaRPr lang="de-CH" dirty="0"/>
+          </a:p>
+        </p:txBody>
+      </p:sp>
+      <p:sp>
+        <p:nvSpPr>
+          <p:cNvPr id="4" name="Slide Number Placeholder 3"/>
+          <p:cNvSpPr>
+            <a:spLocks noGrp="1"/>
+          </p:cNvSpPr>
+          <p:nvPr>
+            <p:ph type="sldNum" sz="quarter" idx="10"/>
+          </p:nvPr>
+        </p:nvSpPr>
+        <p:spPr/>
+        <p:txBody>
+          <a:bodyPr/>
+          <a:lstStyle/>
+          <a:p>
+            <a:fld id="{058061DB-DF71-4765-99A4-14E22DF63CCF}" type="slidenum">
+              <a:rPr lang="de-CH" smtClean="0"/>
+              <a:pPr/>
+              <a:t>3</a:t>
+            </a:fld>
+            <a:endParaRPr lang="de-CH"/>
+          </a:p>
+        </p:txBody>
+      </p:sp>
+    </p:spTree>
+    <p:extLst>
+      <p:ext uri="{BB962C8B-B14F-4D97-AF65-F5344CB8AC3E}">
+        <p14:creationId xmlns:p14="http://schemas.microsoft.com/office/powerpoint/2010/main" val="3068304102"/>
+      </p:ext>
+    </p:extLst>
+  </p:cSld>
+  <p:clrMapOvr>
+    <a:masterClrMapping/>
+  </p:clrMapOvr>
+</p:notes>
+</file>
+
 <file path=ppt/slideLayouts/slideLayout1.xml><?xml version="1.0" encoding="utf-8"?>
 <p:sldLayout xmlns:a="http://schemas.openxmlformats.org/drawingml/2006/main" xmlns:r="http://schemas.openxmlformats.org/officeDocument/2006/relationships" xmlns:p="http://schemas.openxmlformats.org/presentationml/2006/main" showMasterSp="0" preserve="1" userDrawn="1">
   <p:cSld name="Titelfolie">
@@ -1109,14 +1211,14 @@
           <a:ln/>
           <a:extLst>
             <a:ext uri="{909E8E84-426E-40dd-AFC4-6F175D3DCCD1}">
-              <a14:hiddenFill xmlns="" xmlns:a14="http://schemas.microsoft.com/office/drawing/2010/main">
+              <a14:hiddenFill xmlns:a14="http://schemas.microsoft.com/office/drawing/2010/main" xmlns="">
                 <a:solidFill>
                   <a:srgbClr val="FFFFFF"/>
                 </a:solidFill>
               </a14:hiddenFill>
             </a:ext>
             <a:ext uri="{91240B29-F687-4f45-9708-019B960494DF}">
-              <a14:hiddenLine xmlns="" xmlns:a14="http://schemas.microsoft.com/office/drawing/2010/main" w="9525">
+              <a14:hiddenLine xmlns:a14="http://schemas.microsoft.com/office/drawing/2010/main" xmlns="" w="9525">
                 <a:solidFill>
                   <a:srgbClr val="000000"/>
                 </a:solidFill>
@@ -1393,7 +1495,7 @@
                   <a:srgbClr val="000000"/>
                 </a:solidFill>
               </a:rPr>
-              <a:t>15.11.2014</a:t>
+              <a:t>16.11.2014</a:t>
             </a:fld>
             <a:endParaRPr lang="de-CH">
               <a:solidFill>
@@ -1464,7 +1566,7 @@
                 </a:solidFill>
               </a:rPr>
               <a:pPr/>
-              <a:t>‹Nr.›</a:t>
+              <a:t>‹#›</a:t>
             </a:fld>
             <a:endParaRPr lang="de-CH">
               <a:solidFill>
@@ -1603,7 +1705,7 @@
                   <a:srgbClr val="000000"/>
                 </a:solidFill>
               </a:rPr>
-              <a:t>15.11.2014</a:t>
+              <a:t>16.11.2014</a:t>
             </a:fld>
             <a:endParaRPr lang="de-CH">
               <a:solidFill>
@@ -1674,7 +1776,7 @@
                 </a:solidFill>
               </a:rPr>
               <a:pPr/>
-              <a:t>‹Nr.›</a:t>
+              <a:t>‹#›</a:t>
             </a:fld>
             <a:endParaRPr lang="de-CH">
               <a:solidFill>
@@ -1811,7 +1913,7 @@
                   <a:srgbClr val="000000"/>
                 </a:solidFill>
               </a:rPr>
-              <a:t>15.11.2014</a:t>
+              <a:t>16.11.2014</a:t>
             </a:fld>
             <a:endParaRPr lang="de-CH">
               <a:solidFill>
@@ -1882,7 +1984,7 @@
                 </a:solidFill>
               </a:rPr>
               <a:pPr/>
-              <a:t>‹Nr.›</a:t>
+              <a:t>‹#›</a:t>
             </a:fld>
             <a:endParaRPr lang="de-CH">
               <a:solidFill>
@@ -2019,7 +2121,7 @@
                   <a:srgbClr val="000000"/>
                 </a:solidFill>
               </a:rPr>
-              <a:t>15.11.2014</a:t>
+              <a:t>16.11.2014</a:t>
             </a:fld>
             <a:endParaRPr lang="de-CH">
               <a:solidFill>
@@ -2090,7 +2192,7 @@
                 </a:solidFill>
               </a:rPr>
               <a:pPr/>
-              <a:t>‹Nr.›</a:t>
+              <a:t>‹#›</a:t>
             </a:fld>
             <a:endParaRPr lang="de-CH">
               <a:solidFill>
@@ -2266,14 +2368,14 @@
           <a:effectLst/>
           <a:extLst>
             <a:ext uri="{909E8E84-426E-40dd-AFC4-6F175D3DCCD1}">
-              <a14:hiddenFill xmlns="" xmlns:a14="http://schemas.microsoft.com/office/drawing/2010/main">
+              <a14:hiddenFill xmlns:a14="http://schemas.microsoft.com/office/drawing/2010/main" xmlns="">
                 <a:solidFill>
                   <a:schemeClr val="accent1"/>
                 </a:solidFill>
               </a14:hiddenFill>
             </a:ext>
             <a:ext uri="{91240B29-F687-4f45-9708-019B960494DF}">
-              <a14:hiddenLine xmlns="" xmlns:a14="http://schemas.microsoft.com/office/drawing/2010/main" w="9525">
+              <a14:hiddenLine xmlns:a14="http://schemas.microsoft.com/office/drawing/2010/main" xmlns="" w="9525">
                 <a:solidFill>
                   <a:schemeClr val="tx1"/>
                 </a:solidFill>
@@ -2283,7 +2385,7 @@
               </a14:hiddenLine>
             </a:ext>
             <a:ext uri="{AF507438-7753-43e0-B8FC-AC1667EBCBE1}">
-              <a14:hiddenEffects xmlns="" xmlns:a14="http://schemas.microsoft.com/office/drawing/2010/main">
+              <a14:hiddenEffects xmlns:a14="http://schemas.microsoft.com/office/drawing/2010/main" xmlns="">
                 <a:effectLst>
                   <a:outerShdw dist="35921" dir="2700000" algn="ctr" rotWithShape="0">
                     <a:schemeClr val="bg2"/>
@@ -2334,14 +2436,14 @@
           <a:effectLst/>
           <a:extLst>
             <a:ext uri="{909E8E84-426E-40dd-AFC4-6F175D3DCCD1}">
-              <a14:hiddenFill xmlns="" xmlns:a14="http://schemas.microsoft.com/office/drawing/2010/main">
+              <a14:hiddenFill xmlns:a14="http://schemas.microsoft.com/office/drawing/2010/main" xmlns="">
                 <a:solidFill>
                   <a:schemeClr val="accent1"/>
                 </a:solidFill>
               </a14:hiddenFill>
             </a:ext>
             <a:ext uri="{91240B29-F687-4f45-9708-019B960494DF}">
-              <a14:hiddenLine xmlns="" xmlns:a14="http://schemas.microsoft.com/office/drawing/2010/main" w="9525">
+              <a14:hiddenLine xmlns:a14="http://schemas.microsoft.com/office/drawing/2010/main" xmlns="" w="9525">
                 <a:solidFill>
                   <a:schemeClr val="tx1"/>
                 </a:solidFill>
@@ -2351,7 +2453,7 @@
               </a14:hiddenLine>
             </a:ext>
             <a:ext uri="{AF507438-7753-43e0-B8FC-AC1667EBCBE1}">
-              <a14:hiddenEffects xmlns="" xmlns:a14="http://schemas.microsoft.com/office/drawing/2010/main">
+              <a14:hiddenEffects xmlns:a14="http://schemas.microsoft.com/office/drawing/2010/main" xmlns="">
                 <a:effectLst>
                   <a:outerShdw dist="35921" dir="2700000" algn="ctr" rotWithShape="0">
                     <a:schemeClr val="bg2"/>
@@ -2430,14 +2532,14 @@
           <a:effectLst/>
           <a:extLst>
             <a:ext uri="{909E8E84-426E-40dd-AFC4-6F175D3DCCD1}">
-              <a14:hiddenFill xmlns="" xmlns:a14="http://schemas.microsoft.com/office/drawing/2010/main">
+              <a14:hiddenFill xmlns:a14="http://schemas.microsoft.com/office/drawing/2010/main" xmlns="">
                 <a:solidFill>
                   <a:schemeClr val="accent1"/>
                 </a:solidFill>
               </a14:hiddenFill>
             </a:ext>
             <a:ext uri="{91240B29-F687-4f45-9708-019B960494DF}">
-              <a14:hiddenLine xmlns="" xmlns:a14="http://schemas.microsoft.com/office/drawing/2010/main" w="9525">
+              <a14:hiddenLine xmlns:a14="http://schemas.microsoft.com/office/drawing/2010/main" xmlns="" w="9525">
                 <a:solidFill>
                   <a:schemeClr val="tx1"/>
                 </a:solidFill>
@@ -2447,7 +2549,7 @@
               </a14:hiddenLine>
             </a:ext>
             <a:ext uri="{AF507438-7753-43e0-B8FC-AC1667EBCBE1}">
-              <a14:hiddenEffects xmlns="" xmlns:a14="http://schemas.microsoft.com/office/drawing/2010/main">
+              <a14:hiddenEffects xmlns:a14="http://schemas.microsoft.com/office/drawing/2010/main" xmlns="">
                 <a:effectLst>
                   <a:outerShdw dist="35921" dir="2700000" algn="ctr" rotWithShape="0">
                     <a:schemeClr val="bg2"/>
@@ -2475,7 +2577,7 @@
                   <a:srgbClr val="000000"/>
                 </a:solidFill>
               </a:rPr>
-              <a:t>15.11.2014</a:t>
+              <a:t>16.11.2014</a:t>
             </a:fld>
             <a:endParaRPr lang="de-CH">
               <a:solidFill>
@@ -2510,14 +2612,14 @@
           <a:effectLst/>
           <a:extLst>
             <a:ext uri="{909E8E84-426E-40dd-AFC4-6F175D3DCCD1}">
-              <a14:hiddenFill xmlns="" xmlns:a14="http://schemas.microsoft.com/office/drawing/2010/main">
+              <a14:hiddenFill xmlns:a14="http://schemas.microsoft.com/office/drawing/2010/main" xmlns="">
                 <a:solidFill>
                   <a:schemeClr val="accent1"/>
                 </a:solidFill>
               </a14:hiddenFill>
             </a:ext>
             <a:ext uri="{91240B29-F687-4f45-9708-019B960494DF}">
-              <a14:hiddenLine xmlns="" xmlns:a14="http://schemas.microsoft.com/office/drawing/2010/main" w="9525">
+              <a14:hiddenLine xmlns:a14="http://schemas.microsoft.com/office/drawing/2010/main" xmlns="" w="9525">
                 <a:solidFill>
                   <a:schemeClr val="tx1"/>
                 </a:solidFill>
@@ -2527,7 +2629,7 @@
               </a14:hiddenLine>
             </a:ext>
             <a:ext uri="{AF507438-7753-43e0-B8FC-AC1667EBCBE1}">
-              <a14:hiddenEffects xmlns="" xmlns:a14="http://schemas.microsoft.com/office/drawing/2010/main">
+              <a14:hiddenEffects xmlns:a14="http://schemas.microsoft.com/office/drawing/2010/main" xmlns="">
                 <a:effectLst>
                   <a:outerShdw dist="35921" dir="2700000" algn="ctr" rotWithShape="0">
                     <a:schemeClr val="bg2"/>
@@ -2590,14 +2692,14 @@
           <a:effectLst/>
           <a:extLst>
             <a:ext uri="{909E8E84-426E-40dd-AFC4-6F175D3DCCD1}">
-              <a14:hiddenFill xmlns="" xmlns:a14="http://schemas.microsoft.com/office/drawing/2010/main">
+              <a14:hiddenFill xmlns:a14="http://schemas.microsoft.com/office/drawing/2010/main" xmlns="">
                 <a:solidFill>
                   <a:schemeClr val="accent1"/>
                 </a:solidFill>
               </a14:hiddenFill>
             </a:ext>
             <a:ext uri="{91240B29-F687-4f45-9708-019B960494DF}">
-              <a14:hiddenLine xmlns="" xmlns:a14="http://schemas.microsoft.com/office/drawing/2010/main" w="9525">
+              <a14:hiddenLine xmlns:a14="http://schemas.microsoft.com/office/drawing/2010/main" xmlns="" w="9525">
                 <a:solidFill>
                   <a:schemeClr val="tx1"/>
                 </a:solidFill>
@@ -2607,7 +2709,7 @@
               </a14:hiddenLine>
             </a:ext>
             <a:ext uri="{AF507438-7753-43e0-B8FC-AC1667EBCBE1}">
-              <a14:hiddenEffects xmlns="" xmlns:a14="http://schemas.microsoft.com/office/drawing/2010/main">
+              <a14:hiddenEffects xmlns:a14="http://schemas.microsoft.com/office/drawing/2010/main" xmlns="">
                 <a:effectLst>
                   <a:outerShdw dist="35921" dir="2700000" algn="ctr" rotWithShape="0">
                     <a:schemeClr val="bg2"/>
@@ -2636,7 +2738,7 @@
                 </a:solidFill>
               </a:rPr>
               <a:pPr/>
-              <a:t>‹Nr.›</a:t>
+              <a:t>‹#›</a:t>
             </a:fld>
             <a:endParaRPr lang="de-CH">
               <a:solidFill>
@@ -2674,12 +2776,12 @@
           <a:effectLst/>
           <a:extLst>
             <a:ext uri="{909E8E84-426E-40dd-AFC4-6F175D3DCCD1}">
-              <a14:hiddenFill xmlns="" xmlns:a14="http://schemas.microsoft.com/office/drawing/2010/main">
+              <a14:hiddenFill xmlns:a14="http://schemas.microsoft.com/office/drawing/2010/main" xmlns="">
                 <a:noFill/>
               </a14:hiddenFill>
             </a:ext>
             <a:ext uri="{AF507438-7753-43e0-B8FC-AC1667EBCBE1}">
-              <a14:hiddenEffects xmlns="" xmlns:a14="http://schemas.microsoft.com/office/drawing/2010/main">
+              <a14:hiddenEffects xmlns:a14="http://schemas.microsoft.com/office/drawing/2010/main" xmlns="">
                 <a:effectLst>
                   <a:outerShdw dist="35921" dir="2700000" algn="ctr" rotWithShape="0">
                     <a:schemeClr val="bg2"/>
@@ -3298,6 +3400,309 @@
       </p:grpSpPr>
       <p:sp>
         <p:nvSpPr>
+          <p:cNvPr id="2" name="Date Placeholder 1"/>
+          <p:cNvSpPr>
+            <a:spLocks noGrp="1"/>
+          </p:cNvSpPr>
+          <p:nvPr>
+            <p:ph type="dt" sz="half" idx="10"/>
+          </p:nvPr>
+        </p:nvSpPr>
+        <p:spPr/>
+        <p:txBody>
+          <a:bodyPr/>
+          <a:lstStyle/>
+          <a:p>
+            <a:fld id="{5E48492E-72D1-4785-9351-8AE1E40FBA2D}" type="datetime1">
+              <a:rPr lang="de-CH" smtClean="0">
+                <a:solidFill>
+                  <a:srgbClr val="000000"/>
+                </a:solidFill>
+              </a:rPr>
+              <a:t>16.11.2014</a:t>
+            </a:fld>
+            <a:endParaRPr lang="de-CH">
+              <a:solidFill>
+                <a:srgbClr val="000000"/>
+              </a:solidFill>
+            </a:endParaRPr>
+          </a:p>
+        </p:txBody>
+      </p:sp>
+      <p:sp>
+        <p:nvSpPr>
+          <p:cNvPr id="3" name="Footer Placeholder 2"/>
+          <p:cNvSpPr>
+            <a:spLocks noGrp="1"/>
+          </p:cNvSpPr>
+          <p:nvPr>
+            <p:ph type="ftr" sz="quarter" idx="11"/>
+          </p:nvPr>
+        </p:nvSpPr>
+        <p:spPr/>
+        <p:txBody>
+          <a:bodyPr/>
+          <a:lstStyle/>
+          <a:p>
+            <a:r>
+              <a:rPr lang="de-CH" dirty="0" err="1">
+                <a:solidFill>
+                  <a:srgbClr val="000000"/>
+                </a:solidFill>
+              </a:rPr>
+              <a:t>Decimal</a:t>
+            </a:r>
+            <a:r>
+              <a:rPr lang="de-CH" dirty="0">
+                <a:solidFill>
+                  <a:srgbClr val="000000"/>
+                </a:solidFill>
+              </a:rPr>
+              <a:t> in IML, Janis Peyer, Ralf </a:t>
+            </a:r>
+            <a:r>
+              <a:rPr lang="de-CH" dirty="0" smtClean="0">
+                <a:solidFill>
+                  <a:srgbClr val="000000"/>
+                </a:solidFill>
+              </a:rPr>
+              <a:t>Grubenmann</a:t>
+            </a:r>
+            <a:endParaRPr lang="de-CH" dirty="0">
+              <a:solidFill>
+                <a:srgbClr val="000000"/>
+              </a:solidFill>
+            </a:endParaRPr>
+          </a:p>
+        </p:txBody>
+      </p:sp>
+      <p:sp>
+        <p:nvSpPr>
+          <p:cNvPr id="4" name="Slide Number Placeholder 3"/>
+          <p:cNvSpPr>
+            <a:spLocks noGrp="1"/>
+          </p:cNvSpPr>
+          <p:nvPr>
+            <p:ph type="sldNum" sz="quarter" idx="12"/>
+          </p:nvPr>
+        </p:nvSpPr>
+        <p:spPr/>
+        <p:txBody>
+          <a:bodyPr/>
+          <a:lstStyle/>
+          <a:p>
+            <a:fld id="{351188DD-6605-4EF4-9E67-B567F731CE68}" type="slidenum">
+              <a:rPr lang="de-CH" smtClean="0">
+                <a:solidFill>
+                  <a:srgbClr val="000000"/>
+                </a:solidFill>
+              </a:rPr>
+              <a:pPr/>
+              <a:t>2</a:t>
+            </a:fld>
+            <a:endParaRPr lang="de-CH">
+              <a:solidFill>
+                <a:srgbClr val="000000"/>
+              </a:solidFill>
+            </a:endParaRPr>
+          </a:p>
+        </p:txBody>
+      </p:sp>
+      <p:sp>
+        <p:nvSpPr>
+          <p:cNvPr id="5" name="Title 4"/>
+          <p:cNvSpPr>
+            <a:spLocks noGrp="1"/>
+          </p:cNvSpPr>
+          <p:nvPr>
+            <p:ph type="title"/>
+          </p:nvPr>
+        </p:nvSpPr>
+        <p:spPr/>
+        <p:txBody>
+          <a:bodyPr/>
+          <a:lstStyle/>
+          <a:p>
+            <a:r>
+              <a:rPr lang="de-CH" dirty="0" smtClean="0"/>
+              <a:t>Begründung/Vorteile</a:t>
+            </a:r>
+            <a:endParaRPr lang="de-CH" dirty="0"/>
+          </a:p>
+        </p:txBody>
+      </p:sp>
+      <p:sp>
+        <p:nvSpPr>
+          <p:cNvPr id="6" name="Text Placeholder 5"/>
+          <p:cNvSpPr>
+            <a:spLocks noGrp="1"/>
+          </p:cNvSpPr>
+          <p:nvPr>
+            <p:ph type="body" idx="1"/>
+          </p:nvPr>
+        </p:nvSpPr>
+        <p:spPr/>
+        <p:txBody>
+          <a:bodyPr/>
+          <a:lstStyle/>
+          <a:p>
+            <a:pPr marL="342900" indent="-342900">
+              <a:buFont typeface="Arial" panose="020B0604020202020204" pitchFamily="34" charset="0"/>
+              <a:buChar char="•"/>
+            </a:pPr>
+            <a:r>
+              <a:rPr lang="de-CH" dirty="0" smtClean="0"/>
+              <a:t>Repräsentation in Basis 10</a:t>
+            </a:r>
+          </a:p>
+          <a:p>
+            <a:pPr marL="342900" indent="-342900">
+              <a:buFont typeface="Arial" panose="020B0604020202020204" pitchFamily="34" charset="0"/>
+              <a:buChar char="•"/>
+            </a:pPr>
+            <a:r>
+              <a:rPr lang="de-CH" dirty="0" smtClean="0"/>
+              <a:t>Erlaubt exakte Darstellung von Dezimal-Zahlen</a:t>
+            </a:r>
+          </a:p>
+          <a:p>
+            <a:pPr marL="695325" lvl="1" indent="-342900">
+              <a:buFont typeface="Arial" panose="020B0604020202020204" pitchFamily="34" charset="0"/>
+              <a:buChar char="•"/>
+            </a:pPr>
+            <a:r>
+              <a:rPr lang="de-CH" dirty="0" err="1" smtClean="0"/>
+              <a:t>Float</a:t>
+            </a:r>
+            <a:r>
+              <a:rPr lang="de-CH" dirty="0"/>
+              <a:t>: </a:t>
+            </a:r>
+            <a:r>
+              <a:rPr lang="de-CH" dirty="0" smtClean="0"/>
+              <a:t>1.0000000000001 + 1.0000000000001 = 2</a:t>
+            </a:r>
+          </a:p>
+          <a:p>
+            <a:pPr marL="695325" lvl="1" indent="-342900">
+              <a:buFont typeface="Arial" panose="020B0604020202020204" pitchFamily="34" charset="0"/>
+              <a:buChar char="•"/>
+            </a:pPr>
+            <a:r>
+              <a:rPr lang="de-CH" dirty="0" err="1" smtClean="0"/>
+              <a:t>Decimal</a:t>
+            </a:r>
+            <a:r>
+              <a:rPr lang="de-CH" dirty="0" smtClean="0"/>
+              <a:t>: 1.0000000000001 + 1.0000000000001 = 2.0000000000002</a:t>
+            </a:r>
+          </a:p>
+          <a:p>
+            <a:pPr marL="342900" indent="-342900">
+              <a:buFont typeface="Arial" panose="020B0604020202020204" pitchFamily="34" charset="0"/>
+              <a:buChar char="•"/>
+            </a:pPr>
+            <a:r>
+              <a:rPr lang="de-CH" dirty="0" smtClean="0"/>
+              <a:t>Aber: Z.B. 1/3 lässt sich (auch) nicht exakt darstellen</a:t>
+            </a:r>
+          </a:p>
+          <a:p>
+            <a:pPr marL="695325" lvl="1" indent="-342900">
+              <a:buFont typeface="Arial" panose="020B0604020202020204" pitchFamily="34" charset="0"/>
+              <a:buChar char="•"/>
+            </a:pPr>
+            <a:r>
+              <a:rPr lang="de-CH" dirty="0" err="1" smtClean="0"/>
+              <a:t>Decimal</a:t>
+            </a:r>
+            <a:r>
+              <a:rPr lang="de-CH" dirty="0" smtClean="0"/>
+              <a:t>: 0.3333333333333333333333333333</a:t>
+            </a:r>
+          </a:p>
+          <a:p>
+            <a:pPr marL="695325" lvl="1" indent="-342900">
+              <a:buFont typeface="Arial" panose="020B0604020202020204" pitchFamily="34" charset="0"/>
+              <a:buChar char="•"/>
+            </a:pPr>
+            <a:r>
+              <a:rPr lang="de-CH" dirty="0" err="1" smtClean="0"/>
+              <a:t>Float</a:t>
+            </a:r>
+            <a:r>
+              <a:rPr lang="de-CH" dirty="0" smtClean="0"/>
+              <a:t>: </a:t>
+            </a:r>
+            <a:r>
+              <a:rPr lang="de-CH" dirty="0"/>
+              <a:t>0.333333343</a:t>
+            </a:r>
+            <a:endParaRPr lang="de-CH" dirty="0" smtClean="0"/>
+          </a:p>
+          <a:p>
+            <a:pPr marL="695325" lvl="1" indent="-342900">
+              <a:buFont typeface="Arial" panose="020B0604020202020204" pitchFamily="34" charset="0"/>
+              <a:buChar char="•"/>
+            </a:pPr>
+            <a:r>
+              <a:rPr lang="de-CH" dirty="0" err="1" smtClean="0"/>
+              <a:t>Decimal</a:t>
+            </a:r>
+            <a:r>
+              <a:rPr lang="de-CH" dirty="0" smtClean="0"/>
+              <a:t>: 3 x (1/3) = 0.9999999999999999999999999999</a:t>
+            </a:r>
+          </a:p>
+          <a:p>
+            <a:pPr marL="695325" lvl="1" indent="-342900">
+              <a:buFont typeface="Arial" panose="020B0604020202020204" pitchFamily="34" charset="0"/>
+              <a:buChar char="•"/>
+            </a:pPr>
+            <a:r>
+              <a:rPr lang="de-CH" dirty="0" err="1" smtClean="0"/>
+              <a:t>Float</a:t>
+            </a:r>
+            <a:r>
+              <a:rPr lang="de-CH" dirty="0" smtClean="0"/>
+              <a:t>: 3 x 0.333333343 = 1.0</a:t>
+            </a:r>
+            <a:endParaRPr lang="de-CH" dirty="0"/>
+          </a:p>
+        </p:txBody>
+      </p:sp>
+    </p:spTree>
+    <p:extLst>
+      <p:ext uri="{BB962C8B-B14F-4D97-AF65-F5344CB8AC3E}">
+        <p14:creationId xmlns:p14="http://schemas.microsoft.com/office/powerpoint/2010/main" val="2746598833"/>
+      </p:ext>
+    </p:extLst>
+  </p:cSld>
+  <p:clrMapOvr>
+    <a:masterClrMapping/>
+  </p:clrMapOvr>
+</p:sld>
+</file>
+
+<file path=ppt/slides/slide3.xml><?xml version="1.0" encoding="utf-8"?>
+<p:sld xmlns:a="http://schemas.openxmlformats.org/drawingml/2006/main" xmlns:r="http://schemas.openxmlformats.org/officeDocument/2006/relationships" xmlns:p="http://schemas.openxmlformats.org/presentationml/2006/main">
+  <p:cSld>
+    <p:spTree>
+      <p:nvGrpSpPr>
+        <p:cNvPr id="1" name=""/>
+        <p:cNvGrpSpPr/>
+        <p:nvPr/>
+      </p:nvGrpSpPr>
+      <p:grpSpPr>
+        <a:xfrm>
+          <a:off x="0" y="0"/>
+          <a:ext cx="0" cy="0"/>
+          <a:chOff x="0" y="0"/>
+          <a:chExt cx="0" cy="0"/>
+        </a:xfrm>
+      </p:grpSpPr>
+      <p:sp>
+        <p:nvSpPr>
           <p:cNvPr id="2" name="Datumsplatzhalter 1"/>
           <p:cNvSpPr>
             <a:spLocks noGrp="1"/>
@@ -3317,7 +3722,7 @@
                   <a:srgbClr val="000000"/>
                 </a:solidFill>
               </a:rPr>
-              <a:t>15.11.2014</a:t>
+              <a:t>16.11.2014</a:t>
             </a:fld>
             <a:endParaRPr lang="de-CH">
               <a:solidFill>
@@ -3388,7 +3793,7 @@
                 </a:solidFill>
               </a:rPr>
               <a:pPr/>
-              <a:t>2</a:t>
+              <a:t>3</a:t>
             </a:fld>
             <a:endParaRPr lang="de-CH">
               <a:solidFill>
@@ -3590,7 +3995,7 @@
           <a:effectLst/>
           <a:extLst>
             <a:ext uri="{AF507438-7753-43e0-B8FC-AC1667EBCBE1}">
-              <a14:hiddenEffects xmlns="" xmlns:a14="http://schemas.microsoft.com/office/drawing/2010/main">
+              <a14:hiddenEffects xmlns:a14="http://schemas.microsoft.com/office/drawing/2010/main" xmlns="">
                 <a:effectLst>
                   <a:outerShdw dist="35921" dir="2700000" algn="ctr" rotWithShape="0">
                     <a:schemeClr val="bg2"/>
@@ -3666,7 +4071,7 @@
           <a:effectLst/>
           <a:extLst>
             <a:ext uri="{AF507438-7753-43e0-B8FC-AC1667EBCBE1}">
-              <a14:hiddenEffects xmlns="" xmlns:a14="http://schemas.microsoft.com/office/drawing/2010/main">
+              <a14:hiddenEffects xmlns:a14="http://schemas.microsoft.com/office/drawing/2010/main" xmlns="">
                 <a:effectLst>
                   <a:outerShdw dist="35921" dir="2700000" algn="ctr" rotWithShape="0">
                     <a:schemeClr val="bg2"/>
@@ -3742,7 +4147,7 @@
           <a:effectLst/>
           <a:extLst>
             <a:ext uri="{AF507438-7753-43e0-B8FC-AC1667EBCBE1}">
-              <a14:hiddenEffects xmlns="" xmlns:a14="http://schemas.microsoft.com/office/drawing/2010/main">
+              <a14:hiddenEffects xmlns:a14="http://schemas.microsoft.com/office/drawing/2010/main" xmlns="">
                 <a:effectLst>
                   <a:outerShdw dist="35921" dir="2700000" algn="ctr" rotWithShape="0">
                     <a:schemeClr val="bg2"/>
@@ -3962,7 +4367,7 @@
           <a:effectLst/>
           <a:extLst>
             <a:ext uri="{AF507438-7753-43e0-B8FC-AC1667EBCBE1}">
-              <a14:hiddenEffects xmlns="" xmlns:a14="http://schemas.microsoft.com/office/drawing/2010/main">
+              <a14:hiddenEffects xmlns:a14="http://schemas.microsoft.com/office/drawing/2010/main" xmlns="">
                 <a:effectLst>
                   <a:outerShdw dist="35921" dir="2700000" algn="ctr" rotWithShape="0">
                     <a:schemeClr val="bg2"/>
@@ -4002,7 +4407,7 @@
           <a:effectLst/>
           <a:extLst>
             <a:ext uri="{AF507438-7753-43e0-B8FC-AC1667EBCBE1}">
-              <a14:hiddenEffects xmlns="" xmlns:a14="http://schemas.microsoft.com/office/drawing/2010/main">
+              <a14:hiddenEffects xmlns:a14="http://schemas.microsoft.com/office/drawing/2010/main" xmlns="">
                 <a:effectLst>
                   <a:outerShdw dist="35921" dir="2700000" algn="ctr" rotWithShape="0">
                     <a:schemeClr val="bg2"/>
@@ -4042,7 +4447,7 @@
           <a:effectLst/>
           <a:extLst>
             <a:ext uri="{AF507438-7753-43e0-B8FC-AC1667EBCBE1}">
-              <a14:hiddenEffects xmlns="" xmlns:a14="http://schemas.microsoft.com/office/drawing/2010/main">
+              <a14:hiddenEffects xmlns:a14="http://schemas.microsoft.com/office/drawing/2010/main" xmlns="">
                 <a:effectLst>
                   <a:outerShdw dist="35921" dir="2700000" algn="ctr" rotWithShape="0">
                     <a:schemeClr val="bg2"/>
@@ -4303,7 +4708,7 @@
 </p:sld>
 </file>
 
-<file path=ppt/slides/slide3.xml><?xml version="1.0" encoding="utf-8"?>
+<file path=ppt/slides/slide4.xml><?xml version="1.0" encoding="utf-8"?>
 <p:sld xmlns:a="http://schemas.openxmlformats.org/drawingml/2006/main" xmlns:r="http://schemas.openxmlformats.org/officeDocument/2006/relationships" xmlns:p="http://schemas.openxmlformats.org/presentationml/2006/main">
   <p:cSld>
     <p:spTree>
@@ -4341,7 +4746,7 @@
                   <a:srgbClr val="000000"/>
                 </a:solidFill>
               </a:rPr>
-              <a:t>15.11.2014</a:t>
+              <a:t>16.11.2014</a:t>
             </a:fld>
             <a:endParaRPr lang="de-CH">
               <a:solidFill>
@@ -4420,7 +4825,7 @@
                 </a:solidFill>
               </a:rPr>
               <a:pPr/>
-              <a:t>3</a:t>
+              <a:t>4</a:t>
             </a:fld>
             <a:endParaRPr lang="de-CH">
               <a:solidFill>
@@ -4656,7 +5061,7 @@
 </p:sld>
 </file>
 
-<file path=ppt/slides/slide4.xml><?xml version="1.0" encoding="utf-8"?>
+<file path=ppt/slides/slide5.xml><?xml version="1.0" encoding="utf-8"?>
 <p:sld xmlns:a="http://schemas.openxmlformats.org/drawingml/2006/main" xmlns:r="http://schemas.openxmlformats.org/officeDocument/2006/relationships" xmlns:p="http://schemas.openxmlformats.org/presentationml/2006/main">
   <p:cSld>
     <p:spTree>
@@ -4694,7 +5099,7 @@
                   <a:srgbClr val="000000"/>
                 </a:solidFill>
               </a:rPr>
-              <a:t>15.11.2014</a:t>
+              <a:t>16.11.2014</a:t>
             </a:fld>
             <a:endParaRPr lang="de-CH">
               <a:solidFill>
@@ -4760,7 +5165,7 @@
                 </a:solidFill>
               </a:rPr>
               <a:pPr/>
-              <a:t>4</a:t>
+              <a:t>5</a:t>
             </a:fld>
             <a:endParaRPr lang="de-CH">
               <a:solidFill>
@@ -6165,7 +6570,7 @@
 </p:sld>
 </file>
 
-<file path=ppt/slides/slide5.xml><?xml version="1.0" encoding="utf-8"?>
+<file path=ppt/slides/slide6.xml><?xml version="1.0" encoding="utf-8"?>
 <p:sld xmlns:a="http://schemas.openxmlformats.org/drawingml/2006/main" xmlns:r="http://schemas.openxmlformats.org/officeDocument/2006/relationships" xmlns:p="http://schemas.openxmlformats.org/presentationml/2006/main">
   <p:cSld>
     <p:spTree>
@@ -6203,7 +6608,7 @@
                   <a:srgbClr val="000000"/>
                 </a:solidFill>
               </a:rPr>
-              <a:t>15.11.2014</a:t>
+              <a:t>16.11.2014</a:t>
             </a:fld>
             <a:endParaRPr lang="de-CH">
               <a:solidFill>
@@ -6269,7 +6674,7 @@
                 </a:solidFill>
               </a:rPr>
               <a:pPr/>
-              <a:t>5</a:t>
+              <a:t>6</a:t>
             </a:fld>
             <a:endParaRPr lang="de-CH">
               <a:solidFill>
@@ -6339,11 +6744,7 @@
             </a:r>
             <a:r>
               <a:rPr lang="de-CH" dirty="0" smtClean="0"/>
-              <a:t>| </a:t>
-            </a:r>
-            <a:r>
-              <a:rPr lang="de-CH" dirty="0" smtClean="0"/>
-              <a:t>DECIMAL</a:t>
+              <a:t>| DECIMAL</a:t>
             </a:r>
           </a:p>
           <a:p>
@@ -6367,7 +6768,6 @@
               <a:rPr lang="de-CH" dirty="0"/>
               <a:t>= INT32 | DECIMAL</a:t>
             </a:r>
-            <a:endParaRPr lang="de-CH" dirty="0"/>
           </a:p>
           <a:p>
             <a:endParaRPr lang="de-CH" dirty="0" smtClean="0"/>
@@ -6511,11 +6911,7 @@
                       </a:r>
                       <a:r>
                         <a:rPr lang="de-CH" dirty="0" smtClean="0"/>
-                        <a:t> 1234.5678</a:t>
-                      </a:r>
-                      <a:r>
-                        <a:rPr lang="de-CH" dirty="0" smtClean="0"/>
-                        <a:t>)</a:t>
+                        <a:t> 1234.5678)</a:t>
                       </a:r>
                     </a:p>
                     <a:p>
@@ -6560,7 +6956,7 @@
 </p:sld>
 </file>
 
-<file path=ppt/slides/slide6.xml><?xml version="1.0" encoding="utf-8"?>
+<file path=ppt/slides/slide7.xml><?xml version="1.0" encoding="utf-8"?>
 <p:sld xmlns:a="http://schemas.openxmlformats.org/drawingml/2006/main" xmlns:r="http://schemas.openxmlformats.org/officeDocument/2006/relationships" xmlns:p="http://schemas.openxmlformats.org/presentationml/2006/main">
   <p:cSld>
     <p:spTree>
@@ -6598,7 +6994,7 @@
                   <a:srgbClr val="000000"/>
                 </a:solidFill>
               </a:rPr>
-              <a:t>15.11.2014</a:t>
+              <a:t>16.11.2014</a:t>
             </a:fld>
             <a:endParaRPr lang="de-CH">
               <a:solidFill>
@@ -6664,7 +7060,7 @@
                 </a:solidFill>
               </a:rPr>
               <a:pPr/>
-              <a:t>6</a:t>
+              <a:t>7</a:t>
             </a:fld>
             <a:endParaRPr lang="de-CH">
               <a:solidFill>
@@ -6743,92 +7139,69 @@
               <a:t>term3 ::= </a:t>
             </a:r>
             <a:r>
+              <a:rPr lang="de-CH" sz="1800" dirty="0" err="1" smtClean="0"/>
+              <a:t>factor</a:t>
+            </a:r>
+            <a:r>
               <a:rPr lang="de-CH" sz="1800" dirty="0" smtClean="0"/>
-              <a:t>term4 {MULTOPR term4} </a:t>
-            </a:r>
-          </a:p>
-          <a:p>
-            <a:r>
-              <a:rPr lang="de-CH" sz="1800" dirty="0" smtClean="0">
-                <a:solidFill>
-                  <a:srgbClr val="00B050"/>
-                </a:solidFill>
-              </a:rPr>
-              <a:t>term4 ::= </a:t>
-            </a:r>
-            <a:r>
-              <a:rPr lang="de-CH" sz="1800" dirty="0" err="1" smtClean="0">
-                <a:solidFill>
-                  <a:srgbClr val="00B050"/>
-                </a:solidFill>
-              </a:rPr>
+              <a:t> {MULTOPR </a:t>
+            </a:r>
+            <a:r>
+              <a:rPr lang="de-CH" sz="1800" dirty="0" err="1" smtClean="0"/>
               <a:t>factor</a:t>
             </a:r>
             <a:r>
-              <a:rPr lang="de-CH" sz="1800" dirty="0" smtClean="0">
-                <a:solidFill>
-                  <a:srgbClr val="00B050"/>
-                </a:solidFill>
-              </a:rPr>
-              <a:t> | CASTOPR </a:t>
-            </a:r>
-            <a:r>
-              <a:rPr lang="de-CH" sz="1800" dirty="0" err="1" smtClean="0">
-                <a:solidFill>
-                  <a:srgbClr val="00B050"/>
-                </a:solidFill>
-              </a:rPr>
+              <a:rPr lang="de-CH" sz="1800" dirty="0" smtClean="0"/>
+              <a:t>} </a:t>
+            </a:r>
+          </a:p>
+          <a:p>
+            <a:r>
+              <a:rPr lang="de-CH" sz="1800" dirty="0" err="1" smtClean="0"/>
               <a:t>factor</a:t>
             </a:r>
-            <a:endParaRPr lang="de-CH" sz="1800" dirty="0">
-              <a:solidFill>
-                <a:srgbClr val="00B050"/>
-              </a:solidFill>
-            </a:endParaRPr>
-          </a:p>
-          <a:p>
+            <a:r>
+              <a:rPr lang="de-CH" sz="1800" dirty="0" smtClean="0"/>
+              <a:t> </a:t>
+            </a:r>
+            <a:r>
+              <a:rPr lang="de-CH" sz="1800" dirty="0"/>
+              <a:t>::= LITERAL </a:t>
+            </a:r>
+          </a:p>
+          <a:p>
+            <a:r>
+              <a:rPr lang="de-CH" sz="1800" dirty="0"/>
+              <a:t>| IDENT [INIT | </a:t>
+            </a:r>
+            <a:r>
+              <a:rPr lang="de-CH" sz="1800" dirty="0" err="1"/>
+              <a:t>exprList</a:t>
+            </a:r>
+            <a:r>
+              <a:rPr lang="de-CH" sz="1800" dirty="0"/>
+              <a:t>] </a:t>
+            </a:r>
+          </a:p>
+          <a:p>
+            <a:r>
+              <a:rPr lang="de-CH" sz="1800" dirty="0"/>
+              <a:t>| </a:t>
+            </a:r>
+            <a:r>
+              <a:rPr lang="de-CH" sz="1800" dirty="0" err="1"/>
+              <a:t>monadicOpr</a:t>
+            </a:r>
+            <a:r>
+              <a:rPr lang="de-CH" sz="1800" dirty="0"/>
+              <a:t> </a:t>
+            </a:r>
             <a:r>
               <a:rPr lang="de-CH" sz="1800" dirty="0" err="1"/>
               <a:t>factor</a:t>
             </a:r>
             <a:r>
               <a:rPr lang="de-CH" sz="1800" dirty="0"/>
-              <a:t> ::= LITERAL </a:t>
-            </a:r>
-          </a:p>
-          <a:p>
-            <a:r>
-              <a:rPr lang="de-CH" sz="1800" dirty="0"/>
-              <a:t>| IDENT [INIT | </a:t>
-            </a:r>
-            <a:r>
-              <a:rPr lang="de-CH" sz="1800" dirty="0" err="1"/>
-              <a:t>exprList</a:t>
-            </a:r>
-            <a:r>
-              <a:rPr lang="de-CH" sz="1800" dirty="0"/>
-              <a:t>] </a:t>
-            </a:r>
-          </a:p>
-          <a:p>
-            <a:r>
-              <a:rPr lang="de-CH" sz="1800" dirty="0"/>
-              <a:t>| </a:t>
-            </a:r>
-            <a:r>
-              <a:rPr lang="de-CH" sz="1800" dirty="0" err="1"/>
-              <a:t>monadicOpr</a:t>
-            </a:r>
-            <a:r>
-              <a:rPr lang="de-CH" sz="1800" dirty="0"/>
-              <a:t> </a:t>
-            </a:r>
-            <a:r>
-              <a:rPr lang="de-CH" sz="1800" dirty="0" err="1"/>
-              <a:t>factor</a:t>
-            </a:r>
-            <a:r>
-              <a:rPr lang="de-CH" sz="1800" dirty="0"/>
               <a:t> </a:t>
             </a:r>
           </a:p>
@@ -6844,6 +7217,33 @@
             <a:r>
               <a:rPr lang="de-CH" sz="1800" dirty="0"/>
               <a:t> RPAREN </a:t>
+            </a:r>
+            <a:endParaRPr lang="de-CH" sz="1800" dirty="0" smtClean="0"/>
+          </a:p>
+          <a:p>
+            <a:r>
+              <a:rPr lang="de-CH" sz="1800" dirty="0">
+                <a:solidFill>
+                  <a:srgbClr val="00B050"/>
+                </a:solidFill>
+              </a:rPr>
+              <a:t>| CASTTYPE LPAREN &lt;</a:t>
+            </a:r>
+            <a:r>
+              <a:rPr lang="de-CH" sz="1800" dirty="0" err="1">
+                <a:solidFill>
+                  <a:srgbClr val="00B050"/>
+                </a:solidFill>
+              </a:rPr>
+              <a:t>expr</a:t>
+            </a:r>
+            <a:r>
+              <a:rPr lang="de-CH" sz="1800" dirty="0">
+                <a:solidFill>
+                  <a:srgbClr val="00B050"/>
+                </a:solidFill>
+              </a:rPr>
+              <a:t>&gt; RPAREN </a:t>
             </a:r>
           </a:p>
         </p:txBody>
@@ -6991,771 +7391,6 @@
 </p:sld>
 </file>
 
-<file path=ppt/slides/slide7.xml><?xml version="1.0" encoding="utf-8"?>
-<p:sld xmlns:a="http://schemas.openxmlformats.org/drawingml/2006/main" xmlns:r="http://schemas.openxmlformats.org/officeDocument/2006/relationships" xmlns:p="http://schemas.openxmlformats.org/presentationml/2006/main">
-  <p:cSld>
-    <p:spTree>
-      <p:nvGrpSpPr>
-        <p:cNvPr id="1" name=""/>
-        <p:cNvGrpSpPr/>
-        <p:nvPr/>
-      </p:nvGrpSpPr>
-      <p:grpSpPr>
-        <a:xfrm>
-          <a:off x="0" y="0"/>
-          <a:ext cx="0" cy="0"/>
-          <a:chOff x="0" y="0"/>
-          <a:chExt cx="0" cy="0"/>
-        </a:xfrm>
-      </p:grpSpPr>
-      <p:sp>
-        <p:nvSpPr>
-          <p:cNvPr id="2" name="Date Placeholder 1"/>
-          <p:cNvSpPr>
-            <a:spLocks noGrp="1"/>
-          </p:cNvSpPr>
-          <p:nvPr>
-            <p:ph type="dt" sz="half" idx="10"/>
-          </p:nvPr>
-        </p:nvSpPr>
-        <p:spPr/>
-        <p:txBody>
-          <a:bodyPr/>
-          <a:lstStyle/>
-          <a:p>
-            <a:fld id="{5E48492E-72D1-4785-9351-8AE1E40FBA2D}" type="datetime1">
-              <a:rPr lang="de-CH" smtClean="0">
-                <a:solidFill>
-                  <a:srgbClr val="000000"/>
-                </a:solidFill>
-              </a:rPr>
-              <a:t>15.11.2014</a:t>
-            </a:fld>
-            <a:endParaRPr lang="de-CH">
-              <a:solidFill>
-                <a:srgbClr val="000000"/>
-              </a:solidFill>
-            </a:endParaRPr>
-          </a:p>
-        </p:txBody>
-      </p:sp>
-      <p:sp>
-        <p:nvSpPr>
-          <p:cNvPr id="3" name="Footer Placeholder 2"/>
-          <p:cNvSpPr>
-            <a:spLocks noGrp="1"/>
-          </p:cNvSpPr>
-          <p:nvPr>
-            <p:ph type="ftr" sz="quarter" idx="11"/>
-          </p:nvPr>
-        </p:nvSpPr>
-        <p:spPr/>
-        <p:txBody>
-          <a:bodyPr/>
-          <a:lstStyle/>
-          <a:p>
-            <a:r>
-              <a:rPr lang="de-CH" dirty="0" err="1">
-                <a:solidFill>
-                  <a:srgbClr val="000000"/>
-                </a:solidFill>
-              </a:rPr>
-              <a:t>Decimal</a:t>
-            </a:r>
-            <a:r>
-              <a:rPr lang="de-CH" dirty="0">
-                <a:solidFill>
-                  <a:srgbClr val="000000"/>
-                </a:solidFill>
-              </a:rPr>
-              <a:t> in IML, Janis Peyer, Ralf Grubenmann</a:t>
-            </a:r>
-          </a:p>
-        </p:txBody>
-      </p:sp>
-      <p:sp>
-        <p:nvSpPr>
-          <p:cNvPr id="4" name="Slide Number Placeholder 3"/>
-          <p:cNvSpPr>
-            <a:spLocks noGrp="1"/>
-          </p:cNvSpPr>
-          <p:nvPr>
-            <p:ph type="sldNum" sz="quarter" idx="12"/>
-          </p:nvPr>
-        </p:nvSpPr>
-        <p:spPr/>
-        <p:txBody>
-          <a:bodyPr/>
-          <a:lstStyle/>
-          <a:p>
-            <a:fld id="{351188DD-6605-4EF4-9E67-B567F731CE68}" type="slidenum">
-              <a:rPr lang="de-CH" smtClean="0">
-                <a:solidFill>
-                  <a:srgbClr val="000000"/>
-                </a:solidFill>
-              </a:rPr>
-              <a:pPr/>
-              <a:t>7</a:t>
-            </a:fld>
-            <a:endParaRPr lang="de-CH">
-              <a:solidFill>
-                <a:srgbClr val="000000"/>
-              </a:solidFill>
-            </a:endParaRPr>
-          </a:p>
-        </p:txBody>
-      </p:sp>
-      <p:sp>
-        <p:nvSpPr>
-          <p:cNvPr id="5" name="Title 4"/>
-          <p:cNvSpPr>
-            <a:spLocks noGrp="1"/>
-          </p:cNvSpPr>
-          <p:nvPr>
-            <p:ph type="title"/>
-          </p:nvPr>
-        </p:nvSpPr>
-        <p:spPr/>
-        <p:txBody>
-          <a:bodyPr/>
-          <a:lstStyle/>
-          <a:p>
-            <a:r>
-              <a:rPr lang="de-CH" dirty="0" smtClean="0"/>
-              <a:t>Beispiel</a:t>
-            </a:r>
-            <a:endParaRPr lang="de-CH" dirty="0"/>
-          </a:p>
-        </p:txBody>
-      </p:sp>
-      <p:sp>
-        <p:nvSpPr>
-          <p:cNvPr id="6" name="Text Placeholder 5"/>
-          <p:cNvSpPr>
-            <a:spLocks noGrp="1"/>
-          </p:cNvSpPr>
-          <p:nvPr>
-            <p:ph type="body" idx="1"/>
-          </p:nvPr>
-        </p:nvSpPr>
-        <p:spPr/>
-        <p:txBody>
-          <a:bodyPr/>
-          <a:lstStyle/>
-          <a:p>
-            <a:pPr>
-              <a:lnSpc>
-                <a:spcPct val="100000"/>
-              </a:lnSpc>
-              <a:spcBef>
-                <a:spcPts val="0"/>
-              </a:spcBef>
-            </a:pPr>
-            <a:r>
-              <a:rPr lang="de-CH" sz="1400" spc="40" dirty="0" err="1">
-                <a:latin typeface="Inconsolata" panose="020B0609030003000000" pitchFamily="50" charset="0"/>
-              </a:rPr>
-              <a:t>program</a:t>
-            </a:r>
-            <a:r>
-              <a:rPr lang="de-CH" sz="1400" spc="40" dirty="0">
-                <a:latin typeface="Inconsolata" panose="020B0609030003000000" pitchFamily="50" charset="0"/>
-              </a:rPr>
-              <a:t> </a:t>
-            </a:r>
-            <a:r>
-              <a:rPr lang="de-CH" sz="1400" spc="40" dirty="0" err="1">
-                <a:latin typeface="Inconsolata" panose="020B0609030003000000" pitchFamily="50" charset="0"/>
-              </a:rPr>
-              <a:t>example</a:t>
-            </a:r>
-            <a:r>
-              <a:rPr lang="de-CH" sz="1400" spc="40" dirty="0">
-                <a:latin typeface="Inconsolata" panose="020B0609030003000000" pitchFamily="50" charset="0"/>
-              </a:rPr>
-              <a:t>()</a:t>
-            </a:r>
-          </a:p>
-          <a:p>
-            <a:pPr>
-              <a:lnSpc>
-                <a:spcPct val="100000"/>
-              </a:lnSpc>
-              <a:spcBef>
-                <a:spcPts val="0"/>
-              </a:spcBef>
-            </a:pPr>
-            <a:r>
-              <a:rPr lang="de-CH" sz="1400" spc="40" dirty="0">
-                <a:latin typeface="Inconsolata" panose="020B0609030003000000" pitchFamily="50" charset="0"/>
-              </a:rPr>
-              <a:t>global</a:t>
-            </a:r>
-          </a:p>
-          <a:p>
-            <a:pPr>
-              <a:lnSpc>
-                <a:spcPct val="100000"/>
-              </a:lnSpc>
-              <a:spcBef>
-                <a:spcPts val="0"/>
-              </a:spcBef>
-            </a:pPr>
-            <a:r>
-              <a:rPr lang="de-CH" sz="1400" spc="40" dirty="0">
-                <a:latin typeface="Inconsolata" panose="020B0609030003000000" pitchFamily="50" charset="0"/>
-              </a:rPr>
-              <a:t>	</a:t>
-            </a:r>
-            <a:r>
-              <a:rPr lang="de-CH" sz="1400" spc="40" dirty="0" err="1">
-                <a:latin typeface="Inconsolata" panose="020B0609030003000000" pitchFamily="50" charset="0"/>
-              </a:rPr>
-              <a:t>var</a:t>
-            </a:r>
-            <a:r>
-              <a:rPr lang="de-CH" sz="1400" spc="40" dirty="0">
-                <a:latin typeface="Inconsolata" panose="020B0609030003000000" pitchFamily="50" charset="0"/>
-              </a:rPr>
-              <a:t> </a:t>
-            </a:r>
-            <a:r>
-              <a:rPr lang="de-CH" sz="1400" spc="40" dirty="0" smtClean="0">
-                <a:latin typeface="Inconsolata" panose="020B0609030003000000" pitchFamily="50" charset="0"/>
-              </a:rPr>
-              <a:t>i:int32;</a:t>
-            </a:r>
-          </a:p>
-          <a:p>
-            <a:pPr>
-              <a:lnSpc>
-                <a:spcPct val="100000"/>
-              </a:lnSpc>
-              <a:spcBef>
-                <a:spcPts val="0"/>
-              </a:spcBef>
-            </a:pPr>
-            <a:r>
-              <a:rPr lang="de-CH" sz="1400" spc="40" dirty="0" smtClean="0">
-                <a:latin typeface="Inconsolata" panose="020B0609030003000000" pitchFamily="50" charset="0"/>
-              </a:rPr>
-              <a:t>	</a:t>
-            </a:r>
-            <a:r>
-              <a:rPr lang="de-CH" sz="1400" spc="40" dirty="0" err="1" smtClean="0">
-                <a:latin typeface="Inconsolata" panose="020B0609030003000000" pitchFamily="50" charset="0"/>
-              </a:rPr>
-              <a:t>var</a:t>
-            </a:r>
-            <a:r>
-              <a:rPr lang="de-CH" sz="1400" spc="40" dirty="0" smtClean="0">
-                <a:latin typeface="Inconsolata" panose="020B0609030003000000" pitchFamily="50" charset="0"/>
-              </a:rPr>
-              <a:t> </a:t>
-            </a:r>
-            <a:r>
-              <a:rPr lang="de-CH" sz="1400" spc="40" dirty="0">
-                <a:latin typeface="Inconsolata" panose="020B0609030003000000" pitchFamily="50" charset="0"/>
-              </a:rPr>
-              <a:t>x:decimal</a:t>
-            </a:r>
-            <a:r>
-              <a:rPr lang="de-CH" sz="1400" spc="40" dirty="0" smtClean="0">
-                <a:latin typeface="Inconsolata" panose="020B0609030003000000" pitchFamily="50" charset="0"/>
-              </a:rPr>
-              <a:t>; 	</a:t>
-            </a:r>
-          </a:p>
-          <a:p>
-            <a:pPr>
-              <a:lnSpc>
-                <a:spcPct val="100000"/>
-              </a:lnSpc>
-              <a:spcBef>
-                <a:spcPts val="0"/>
-              </a:spcBef>
-            </a:pPr>
-            <a:r>
-              <a:rPr lang="de-CH" sz="1400" spc="40" dirty="0">
-                <a:latin typeface="Inconsolata" panose="020B0609030003000000" pitchFamily="50" charset="0"/>
-              </a:rPr>
-              <a:t>	</a:t>
-            </a:r>
-            <a:r>
-              <a:rPr lang="de-CH" sz="1400" spc="40" dirty="0" err="1" smtClean="0">
-                <a:latin typeface="Inconsolata" panose="020B0609030003000000" pitchFamily="50" charset="0"/>
-              </a:rPr>
-              <a:t>var</a:t>
-            </a:r>
-            <a:r>
-              <a:rPr lang="de-CH" sz="1400" spc="40" dirty="0" smtClean="0">
-                <a:latin typeface="Inconsolata" panose="020B0609030003000000" pitchFamily="50" charset="0"/>
-              </a:rPr>
-              <a:t> </a:t>
-            </a:r>
-            <a:r>
-              <a:rPr lang="de-CH" sz="1400" spc="40" dirty="0">
-                <a:latin typeface="Inconsolata" panose="020B0609030003000000" pitchFamily="50" charset="0"/>
-              </a:rPr>
-              <a:t>z:decimal;</a:t>
-            </a:r>
-          </a:p>
-          <a:p>
-            <a:pPr>
-              <a:lnSpc>
-                <a:spcPct val="100000"/>
-              </a:lnSpc>
-              <a:spcBef>
-                <a:spcPts val="0"/>
-              </a:spcBef>
-            </a:pPr>
-            <a:r>
-              <a:rPr lang="de-CH" sz="1400" spc="40" dirty="0">
-                <a:latin typeface="Inconsolata" panose="020B0609030003000000" pitchFamily="50" charset="0"/>
-              </a:rPr>
-              <a:t>do</a:t>
-            </a:r>
-          </a:p>
-          <a:p>
-            <a:pPr>
-              <a:lnSpc>
-                <a:spcPct val="100000"/>
-              </a:lnSpc>
-              <a:spcBef>
-                <a:spcPts val="0"/>
-              </a:spcBef>
-            </a:pPr>
-            <a:r>
-              <a:rPr lang="de-CH" sz="1400" spc="40" dirty="0">
-                <a:latin typeface="Inconsolata" panose="020B0609030003000000" pitchFamily="50" charset="0"/>
-              </a:rPr>
-              <a:t>	? x </a:t>
-            </a:r>
-            <a:r>
-              <a:rPr lang="de-CH" sz="1400" spc="40" dirty="0" err="1">
-                <a:latin typeface="Inconsolata" panose="020B0609030003000000" pitchFamily="50" charset="0"/>
-              </a:rPr>
-              <a:t>init</a:t>
-            </a:r>
-            <a:r>
-              <a:rPr lang="de-CH" sz="1400" spc="40" dirty="0">
-                <a:latin typeface="Inconsolata" panose="020B0609030003000000" pitchFamily="50" charset="0"/>
-              </a:rPr>
-              <a:t> := 1.0000000000001m </a:t>
-            </a:r>
-            <a:r>
-              <a:rPr lang="de-CH" sz="1400" spc="40" dirty="0" smtClean="0">
-                <a:latin typeface="Inconsolata" panose="020B0609030003000000" pitchFamily="50" charset="0"/>
-              </a:rPr>
-              <a:t>; </a:t>
-            </a:r>
-            <a:r>
-              <a:rPr lang="de-CH" sz="1400" spc="40" dirty="0">
-                <a:latin typeface="Inconsolata" panose="020B0609030003000000" pitchFamily="50" charset="0"/>
-              </a:rPr>
-              <a:t>	</a:t>
-            </a:r>
-            <a:endParaRPr lang="de-CH" sz="1400" spc="40" dirty="0" smtClean="0">
-              <a:latin typeface="Inconsolata" panose="020B0609030003000000" pitchFamily="50" charset="0"/>
-            </a:endParaRPr>
-          </a:p>
-          <a:p>
-            <a:pPr>
-              <a:lnSpc>
-                <a:spcPct val="100000"/>
-              </a:lnSpc>
-              <a:spcBef>
-                <a:spcPts val="0"/>
-              </a:spcBef>
-            </a:pPr>
-            <a:r>
-              <a:rPr lang="de-CH" sz="1400" spc="40" dirty="0">
-                <a:latin typeface="Inconsolata" panose="020B0609030003000000" pitchFamily="50" charset="0"/>
-              </a:rPr>
-              <a:t>	</a:t>
-            </a:r>
-            <a:r>
-              <a:rPr lang="en-US" sz="1400" spc="40" dirty="0" smtClean="0">
-                <a:latin typeface="Inconsolata" panose="020B0609030003000000" pitchFamily="50" charset="0"/>
-              </a:rPr>
-              <a:t>? </a:t>
-            </a:r>
-            <a:r>
-              <a:rPr lang="en-US" sz="1400" spc="40" dirty="0" err="1">
-                <a:latin typeface="Inconsolata" panose="020B0609030003000000" pitchFamily="50" charset="0"/>
-              </a:rPr>
-              <a:t>i</a:t>
-            </a:r>
-            <a:r>
-              <a:rPr lang="en-US" sz="1400" spc="40" dirty="0">
-                <a:latin typeface="Inconsolata" panose="020B0609030003000000" pitchFamily="50" charset="0"/>
-              </a:rPr>
-              <a:t> </a:t>
-            </a:r>
-            <a:r>
-              <a:rPr lang="en-US" sz="1400" spc="40" dirty="0" err="1">
-                <a:latin typeface="Inconsolata" panose="020B0609030003000000" pitchFamily="50" charset="0"/>
-              </a:rPr>
-              <a:t>init</a:t>
-            </a:r>
-            <a:r>
-              <a:rPr lang="en-US" sz="1400" spc="40" dirty="0">
-                <a:latin typeface="Inconsolata" panose="020B0609030003000000" pitchFamily="50" charset="0"/>
-              </a:rPr>
-              <a:t> := 10;</a:t>
-            </a:r>
-            <a:endParaRPr lang="de-CH" sz="1400" spc="40" dirty="0">
-              <a:latin typeface="Inconsolata" panose="020B0609030003000000" pitchFamily="50" charset="0"/>
-            </a:endParaRPr>
-          </a:p>
-          <a:p>
-            <a:pPr>
-              <a:lnSpc>
-                <a:spcPct val="100000"/>
-              </a:lnSpc>
-              <a:spcBef>
-                <a:spcPts val="0"/>
-              </a:spcBef>
-            </a:pPr>
-            <a:r>
-              <a:rPr lang="en-US" sz="1400" spc="40" dirty="0">
-                <a:latin typeface="Inconsolata" panose="020B0609030003000000" pitchFamily="50" charset="0"/>
-              </a:rPr>
-              <a:t>	z := x + </a:t>
-            </a:r>
-            <a:r>
-              <a:rPr lang="en-US" sz="1400" spc="40" dirty="0" smtClean="0">
-                <a:latin typeface="Inconsolata" panose="020B0609030003000000" pitchFamily="50" charset="0"/>
-              </a:rPr>
-              <a:t>x</a:t>
-            </a:r>
-            <a:r>
-              <a:rPr lang="en-US" sz="1400" spc="40" dirty="0">
-                <a:latin typeface="Inconsolata" panose="020B0609030003000000" pitchFamily="50" charset="0"/>
-              </a:rPr>
-              <a:t> ; </a:t>
-            </a:r>
-            <a:r>
-              <a:rPr lang="en-US" sz="1400" spc="40" dirty="0" smtClean="0">
-                <a:latin typeface="Inconsolata" panose="020B0609030003000000" pitchFamily="50" charset="0"/>
-              </a:rPr>
-              <a:t>//2.0000000000002m</a:t>
-            </a:r>
-            <a:endParaRPr lang="de-CH" sz="1400" spc="40" dirty="0">
-              <a:latin typeface="Inconsolata" panose="020B0609030003000000" pitchFamily="50" charset="0"/>
-            </a:endParaRPr>
-          </a:p>
-          <a:p>
-            <a:pPr>
-              <a:lnSpc>
-                <a:spcPct val="100000"/>
-              </a:lnSpc>
-              <a:spcBef>
-                <a:spcPts val="0"/>
-              </a:spcBef>
-            </a:pPr>
-            <a:r>
-              <a:rPr lang="en-US" sz="1400" spc="40" dirty="0">
-                <a:latin typeface="Inconsolata" panose="020B0609030003000000" pitchFamily="50" charset="0"/>
-              </a:rPr>
-              <a:t>	x := </a:t>
-            </a:r>
-            <a:r>
-              <a:rPr lang="en-US" sz="1400" spc="40" dirty="0" smtClean="0">
-                <a:latin typeface="Inconsolata" panose="020B0609030003000000" pitchFamily="50" charset="0"/>
-              </a:rPr>
-              <a:t>5 </a:t>
-            </a:r>
-            <a:r>
-              <a:rPr lang="en-US" sz="1400" spc="40" dirty="0">
-                <a:latin typeface="Inconsolata" panose="020B0609030003000000" pitchFamily="50" charset="0"/>
-              </a:rPr>
-              <a:t>* x ; </a:t>
-            </a:r>
-            <a:r>
-              <a:rPr lang="en-US" sz="1400" spc="40" dirty="0" smtClean="0">
-                <a:latin typeface="Inconsolata" panose="020B0609030003000000" pitchFamily="50" charset="0"/>
-              </a:rPr>
-              <a:t>//5.0000000000005m</a:t>
-            </a:r>
-            <a:r>
-              <a:rPr lang="en-US" sz="1400" spc="40" dirty="0">
-                <a:latin typeface="Inconsolata" panose="020B0609030003000000" pitchFamily="50" charset="0"/>
-              </a:rPr>
-              <a:t>, implicit cast from </a:t>
-            </a:r>
-            <a:r>
-              <a:rPr lang="en-US" sz="1400" spc="40" dirty="0" err="1">
-                <a:latin typeface="Inconsolata" panose="020B0609030003000000" pitchFamily="50" charset="0"/>
-              </a:rPr>
-              <a:t>int</a:t>
-            </a:r>
-            <a:r>
-              <a:rPr lang="en-US" sz="1400" spc="40" dirty="0">
-                <a:latin typeface="Inconsolata" panose="020B0609030003000000" pitchFamily="50" charset="0"/>
-              </a:rPr>
-              <a:t> 2 to decimal</a:t>
-            </a:r>
-            <a:endParaRPr lang="de-CH" sz="1400" spc="40" dirty="0">
-              <a:latin typeface="Inconsolata" panose="020B0609030003000000" pitchFamily="50" charset="0"/>
-            </a:endParaRPr>
-          </a:p>
-          <a:p>
-            <a:pPr>
-              <a:lnSpc>
-                <a:spcPct val="100000"/>
-              </a:lnSpc>
-              <a:spcBef>
-                <a:spcPts val="0"/>
-              </a:spcBef>
-            </a:pPr>
-            <a:r>
-              <a:rPr lang="en-US" sz="1400" spc="40" dirty="0">
-                <a:latin typeface="Inconsolata" panose="020B0609030003000000" pitchFamily="50" charset="0"/>
-              </a:rPr>
-              <a:t>	</a:t>
-            </a:r>
-            <a:r>
-              <a:rPr lang="en-US" sz="1400" spc="40" dirty="0" smtClean="0">
-                <a:latin typeface="Inconsolata" panose="020B0609030003000000" pitchFamily="50" charset="0"/>
-              </a:rPr>
-              <a:t>z</a:t>
-            </a:r>
-            <a:r>
-              <a:rPr lang="en-US" sz="1400" spc="40" dirty="0">
-                <a:latin typeface="Inconsolata" panose="020B0609030003000000" pitchFamily="50" charset="0"/>
-              </a:rPr>
-              <a:t> := </a:t>
-            </a:r>
-            <a:r>
-              <a:rPr lang="en-US" sz="1400" spc="40" dirty="0" smtClean="0">
-                <a:latin typeface="Inconsolata" panose="020B0609030003000000" pitchFamily="50" charset="0"/>
-              </a:rPr>
-              <a:t>5.25m </a:t>
-            </a:r>
-            <a:r>
-              <a:rPr lang="en-US" sz="1400" spc="40" dirty="0">
-                <a:latin typeface="Inconsolata" panose="020B0609030003000000" pitchFamily="50" charset="0"/>
-              </a:rPr>
-              <a:t>/ </a:t>
-            </a:r>
-            <a:r>
-              <a:rPr lang="en-US" sz="1400" spc="40" dirty="0" smtClean="0">
-                <a:latin typeface="Inconsolata" panose="020B0609030003000000" pitchFamily="50" charset="0"/>
-              </a:rPr>
-              <a:t>1.5m</a:t>
-            </a:r>
-            <a:r>
-              <a:rPr lang="en-US" sz="1400" spc="40" dirty="0">
-                <a:latin typeface="Inconsolata" panose="020B0609030003000000" pitchFamily="50" charset="0"/>
-              </a:rPr>
-              <a:t> ; //</a:t>
-            </a:r>
-            <a:r>
-              <a:rPr lang="en-US" sz="1400" spc="40" dirty="0" smtClean="0">
-                <a:latin typeface="Inconsolata" panose="020B0609030003000000" pitchFamily="50" charset="0"/>
-              </a:rPr>
-              <a:t>3.5m</a:t>
-            </a:r>
-            <a:endParaRPr lang="de-CH" sz="1400" spc="40" dirty="0">
-              <a:latin typeface="Inconsolata" panose="020B0609030003000000" pitchFamily="50" charset="0"/>
-            </a:endParaRPr>
-          </a:p>
-          <a:p>
-            <a:pPr>
-              <a:lnSpc>
-                <a:spcPct val="100000"/>
-              </a:lnSpc>
-              <a:spcBef>
-                <a:spcPts val="0"/>
-              </a:spcBef>
-            </a:pPr>
-            <a:r>
-              <a:rPr lang="en-US" sz="1400" spc="40" dirty="0">
-                <a:latin typeface="Inconsolata" panose="020B0609030003000000" pitchFamily="50" charset="0"/>
-              </a:rPr>
-              <a:t>	x := (decimal) </a:t>
-            </a:r>
-            <a:r>
-              <a:rPr lang="en-US" sz="1400" spc="40" dirty="0" err="1">
-                <a:latin typeface="Inconsolata" panose="020B0609030003000000" pitchFamily="50" charset="0"/>
-              </a:rPr>
-              <a:t>i</a:t>
-            </a:r>
-            <a:r>
-              <a:rPr lang="en-US" sz="1400" spc="40" dirty="0">
-                <a:latin typeface="Inconsolata" panose="020B0609030003000000" pitchFamily="50" charset="0"/>
-              </a:rPr>
-              <a:t> ; //explicit cast to decimal, 10.0m</a:t>
-            </a:r>
-            <a:endParaRPr lang="de-CH" sz="1400" spc="40" dirty="0">
-              <a:latin typeface="Inconsolata" panose="020B0609030003000000" pitchFamily="50" charset="0"/>
-            </a:endParaRPr>
-          </a:p>
-          <a:p>
-            <a:pPr>
-              <a:lnSpc>
-                <a:spcPct val="100000"/>
-              </a:lnSpc>
-              <a:spcBef>
-                <a:spcPts val="0"/>
-              </a:spcBef>
-            </a:pPr>
-            <a:r>
-              <a:rPr lang="en-US" sz="1400" spc="40" dirty="0">
-                <a:latin typeface="Inconsolata" panose="020B0609030003000000" pitchFamily="50" charset="0"/>
-              </a:rPr>
-              <a:t>	if  </a:t>
-            </a:r>
-            <a:r>
-              <a:rPr lang="en-US" sz="1400" spc="40" dirty="0" smtClean="0">
-                <a:latin typeface="Inconsolata" panose="020B0609030003000000" pitchFamily="50" charset="0"/>
-              </a:rPr>
-              <a:t>x </a:t>
-            </a:r>
-            <a:r>
-              <a:rPr lang="en-US" sz="1400" spc="40" dirty="0">
-                <a:latin typeface="Inconsolata" panose="020B0609030003000000" pitchFamily="50" charset="0"/>
-              </a:rPr>
-              <a:t>&lt; z then</a:t>
-            </a:r>
-            <a:endParaRPr lang="de-CH" sz="1400" spc="40" dirty="0">
-              <a:latin typeface="Inconsolata" panose="020B0609030003000000" pitchFamily="50" charset="0"/>
-            </a:endParaRPr>
-          </a:p>
-          <a:p>
-            <a:pPr>
-              <a:lnSpc>
-                <a:spcPct val="100000"/>
-              </a:lnSpc>
-              <a:spcBef>
-                <a:spcPts val="0"/>
-              </a:spcBef>
-            </a:pPr>
-            <a:r>
-              <a:rPr lang="en-US" sz="1400" spc="40" dirty="0">
-                <a:latin typeface="Inconsolata" panose="020B0609030003000000" pitchFamily="50" charset="0"/>
-              </a:rPr>
-              <a:t>		</a:t>
-            </a:r>
-            <a:r>
-              <a:rPr lang="en-US" sz="1400" spc="40" dirty="0" err="1">
-                <a:latin typeface="Inconsolata" panose="020B0609030003000000" pitchFamily="50" charset="0"/>
-              </a:rPr>
-              <a:t>i</a:t>
-            </a:r>
-            <a:r>
-              <a:rPr lang="en-US" sz="1400" spc="40" dirty="0">
-                <a:latin typeface="Inconsolata" panose="020B0609030003000000" pitchFamily="50" charset="0"/>
-              </a:rPr>
-              <a:t> := (int32)z; //explicit cast to </a:t>
-            </a:r>
-            <a:r>
-              <a:rPr lang="en-US" sz="1400" spc="40" dirty="0" err="1">
-                <a:latin typeface="Inconsolata" panose="020B0609030003000000" pitchFamily="50" charset="0"/>
-              </a:rPr>
-              <a:t>int</a:t>
-            </a:r>
-            <a:r>
-              <a:rPr lang="en-US" sz="1400" spc="40" dirty="0" smtClean="0">
-                <a:latin typeface="Inconsolata" panose="020B0609030003000000" pitchFamily="50" charset="0"/>
-              </a:rPr>
-              <a:t>, 4</a:t>
-            </a:r>
-            <a:endParaRPr lang="de-CH" sz="1400" spc="40" dirty="0">
-              <a:latin typeface="Inconsolata" panose="020B0609030003000000" pitchFamily="50" charset="0"/>
-            </a:endParaRPr>
-          </a:p>
-          <a:p>
-            <a:pPr>
-              <a:lnSpc>
-                <a:spcPct val="100000"/>
-              </a:lnSpc>
-              <a:spcBef>
-                <a:spcPts val="0"/>
-              </a:spcBef>
-            </a:pPr>
-            <a:r>
-              <a:rPr lang="en-US" sz="1400" spc="40" dirty="0">
-                <a:latin typeface="Inconsolata" panose="020B0609030003000000" pitchFamily="50" charset="0"/>
-              </a:rPr>
-              <a:t>	</a:t>
-            </a:r>
-            <a:r>
-              <a:rPr lang="en-US" sz="1400" spc="40" dirty="0" err="1">
-                <a:latin typeface="Inconsolata" panose="020B0609030003000000" pitchFamily="50" charset="0"/>
-              </a:rPr>
-              <a:t>endif</a:t>
-            </a:r>
-            <a:endParaRPr lang="de-CH" sz="1400" spc="40" dirty="0">
-              <a:latin typeface="Inconsolata" panose="020B0609030003000000" pitchFamily="50" charset="0"/>
-            </a:endParaRPr>
-          </a:p>
-          <a:p>
-            <a:pPr>
-              <a:lnSpc>
-                <a:spcPct val="100000"/>
-              </a:lnSpc>
-              <a:spcBef>
-                <a:spcPts val="0"/>
-              </a:spcBef>
-            </a:pPr>
-            <a:r>
-              <a:rPr lang="en-US" sz="1400" spc="40" dirty="0">
-                <a:latin typeface="Inconsolata" panose="020B0609030003000000" pitchFamily="50" charset="0"/>
-              </a:rPr>
-              <a:t>	</a:t>
-            </a:r>
-            <a:r>
-              <a:rPr lang="en-US" sz="1400" spc="40" dirty="0" smtClean="0">
-                <a:latin typeface="Inconsolata" panose="020B0609030003000000" pitchFamily="50" charset="0"/>
-              </a:rPr>
-              <a:t>z </a:t>
-            </a:r>
-            <a:r>
-              <a:rPr lang="en-US" sz="1400" spc="40" dirty="0">
-                <a:latin typeface="Inconsolata" panose="020B0609030003000000" pitchFamily="50" charset="0"/>
-              </a:rPr>
-              <a:t>:= 792281625142643375935439503360m + 1; // overflow error</a:t>
-            </a:r>
-            <a:endParaRPr lang="de-CH" sz="1400" spc="40" dirty="0">
-              <a:latin typeface="Inconsolata" panose="020B0609030003000000" pitchFamily="50" charset="0"/>
-            </a:endParaRPr>
-          </a:p>
-          <a:p>
-            <a:pPr>
-              <a:lnSpc>
-                <a:spcPct val="100000"/>
-              </a:lnSpc>
-              <a:spcBef>
-                <a:spcPts val="0"/>
-              </a:spcBef>
-            </a:pPr>
-            <a:r>
-              <a:rPr lang="en-US" sz="1400" spc="40" dirty="0" err="1">
-                <a:latin typeface="Inconsolata" panose="020B0609030003000000" pitchFamily="50" charset="0"/>
-              </a:rPr>
-              <a:t>endprogram</a:t>
-            </a:r>
-            <a:endParaRPr lang="de-CH" sz="1400" spc="40" dirty="0">
-              <a:latin typeface="Inconsolata" panose="020B0609030003000000" pitchFamily="50" charset="0"/>
-            </a:endParaRPr>
-          </a:p>
-        </p:txBody>
-      </p:sp>
-    </p:spTree>
-    <p:extLst>
-      <p:ext uri="{BB962C8B-B14F-4D97-AF65-F5344CB8AC3E}">
-        <p14:creationId xmlns:p14="http://schemas.microsoft.com/office/powerpoint/2010/main" val="3364658920"/>
-      </p:ext>
-    </p:extLst>
-  </p:cSld>
-  <p:clrMapOvr>
-    <a:masterClrMapping/>
-  </p:clrMapOvr>
-</p:sld>
-</file>
-
 <file path=ppt/slides/slide8.xml><?xml version="1.0" encoding="utf-8"?>
 <p:sld xmlns:a="http://schemas.openxmlformats.org/drawingml/2006/main" xmlns:r="http://schemas.openxmlformats.org/officeDocument/2006/relationships" xmlns:p="http://schemas.openxmlformats.org/presentationml/2006/main">
   <p:cSld>
@@ -7794,7 +7429,7 @@
                   <a:srgbClr val="000000"/>
                 </a:solidFill>
               </a:rPr>
-              <a:t>15.11.2014</a:t>
+              <a:t>16.11.2014</a:t>
             </a:fld>
             <a:endParaRPr lang="de-CH">
               <a:solidFill>
@@ -7861,6 +7496,1443 @@
               </a:rPr>
               <a:pPr/>
               <a:t>8</a:t>
+            </a:fld>
+            <a:endParaRPr lang="de-CH">
+              <a:solidFill>
+                <a:srgbClr val="000000"/>
+              </a:solidFill>
+            </a:endParaRPr>
+          </a:p>
+        </p:txBody>
+      </p:sp>
+      <p:sp>
+        <p:nvSpPr>
+          <p:cNvPr id="5" name="Title 4"/>
+          <p:cNvSpPr>
+            <a:spLocks noGrp="1"/>
+          </p:cNvSpPr>
+          <p:nvPr>
+            <p:ph type="title"/>
+          </p:nvPr>
+        </p:nvSpPr>
+        <p:spPr/>
+        <p:txBody>
+          <a:bodyPr/>
+          <a:lstStyle/>
+          <a:p>
+            <a:r>
+              <a:rPr lang="de-CH" dirty="0" smtClean="0"/>
+              <a:t>Beispiel</a:t>
+            </a:r>
+            <a:endParaRPr lang="de-CH" dirty="0"/>
+          </a:p>
+        </p:txBody>
+      </p:sp>
+      <p:sp>
+        <p:nvSpPr>
+          <p:cNvPr id="6" name="Text Placeholder 5"/>
+          <p:cNvSpPr>
+            <a:spLocks noGrp="1"/>
+          </p:cNvSpPr>
+          <p:nvPr>
+            <p:ph type="body" idx="1"/>
+          </p:nvPr>
+        </p:nvSpPr>
+        <p:spPr/>
+        <p:txBody>
+          <a:bodyPr/>
+          <a:lstStyle/>
+          <a:p>
+            <a:pPr>
+              <a:lnSpc>
+                <a:spcPct val="100000"/>
+              </a:lnSpc>
+              <a:spcBef>
+                <a:spcPts val="0"/>
+              </a:spcBef>
+            </a:pPr>
+            <a:r>
+              <a:rPr lang="en-GB" sz="1400" dirty="0" smtClean="0">
+                <a:solidFill>
+                  <a:schemeClr val="accent5">
+                    <a:lumMod val="50000"/>
+                  </a:schemeClr>
+                </a:solidFill>
+                <a:latin typeface="Inconsolata" panose="020B0609030003000000" pitchFamily="50" charset="0"/>
+              </a:rPr>
+              <a:t>program </a:t>
+            </a:r>
+            <a:r>
+              <a:rPr lang="en-GB" sz="1400" dirty="0" smtClean="0">
+                <a:latin typeface="Inconsolata" panose="020B0609030003000000" pitchFamily="50" charset="0"/>
+              </a:rPr>
+              <a:t>interest(</a:t>
+            </a:r>
+            <a:r>
+              <a:rPr lang="en-GB" sz="1400" dirty="0" smtClean="0">
+                <a:solidFill>
+                  <a:schemeClr val="accent5">
+                    <a:lumMod val="50000"/>
+                  </a:schemeClr>
+                </a:solidFill>
+                <a:latin typeface="Inconsolata" panose="020B0609030003000000" pitchFamily="50" charset="0"/>
+              </a:rPr>
+              <a:t>in </a:t>
+            </a:r>
+            <a:r>
+              <a:rPr lang="en-GB" sz="1400" dirty="0" err="1" smtClean="0">
+                <a:solidFill>
+                  <a:schemeClr val="accent5">
+                    <a:lumMod val="50000"/>
+                  </a:schemeClr>
+                </a:solidFill>
+                <a:latin typeface="Inconsolata" panose="020B0609030003000000" pitchFamily="50" charset="0"/>
+              </a:rPr>
+              <a:t>const</a:t>
+            </a:r>
+            <a:r>
+              <a:rPr lang="en-GB" sz="1400" dirty="0" smtClean="0">
+                <a:latin typeface="Inconsolata" panose="020B0609030003000000" pitchFamily="50" charset="0"/>
+              </a:rPr>
+              <a:t> capital0:</a:t>
+            </a:r>
+            <a:r>
+              <a:rPr lang="en-GB" sz="1400" dirty="0" smtClean="0">
+                <a:solidFill>
+                  <a:schemeClr val="accent5">
+                    <a:lumMod val="50000"/>
+                  </a:schemeClr>
+                </a:solidFill>
+                <a:latin typeface="Inconsolata" panose="020B0609030003000000" pitchFamily="50" charset="0"/>
+              </a:rPr>
+              <a:t>decimal</a:t>
+            </a:r>
+            <a:r>
+              <a:rPr lang="en-GB" sz="1400" dirty="0" smtClean="0">
+                <a:latin typeface="Inconsolata" panose="020B0609030003000000" pitchFamily="50" charset="0"/>
+              </a:rPr>
+              <a:t>, </a:t>
+            </a:r>
+            <a:r>
+              <a:rPr lang="en-GB" sz="1400" dirty="0" smtClean="0">
+                <a:solidFill>
+                  <a:schemeClr val="accent5">
+                    <a:lumMod val="50000"/>
+                  </a:schemeClr>
+                </a:solidFill>
+                <a:latin typeface="Inconsolata" panose="020B0609030003000000" pitchFamily="50" charset="0"/>
+              </a:rPr>
+              <a:t>in </a:t>
+            </a:r>
+            <a:r>
+              <a:rPr lang="en-GB" sz="1400" dirty="0" err="1" smtClean="0">
+                <a:solidFill>
+                  <a:schemeClr val="accent5">
+                    <a:lumMod val="50000"/>
+                  </a:schemeClr>
+                </a:solidFill>
+                <a:latin typeface="Inconsolata" panose="020B0609030003000000" pitchFamily="50" charset="0"/>
+              </a:rPr>
+              <a:t>const</a:t>
+            </a:r>
+            <a:r>
+              <a:rPr lang="en-GB" sz="1400" dirty="0" smtClean="0">
+                <a:solidFill>
+                  <a:schemeClr val="accent5">
+                    <a:lumMod val="50000"/>
+                  </a:schemeClr>
+                </a:solidFill>
+                <a:latin typeface="Inconsolata" panose="020B0609030003000000" pitchFamily="50" charset="0"/>
+              </a:rPr>
+              <a:t> </a:t>
+            </a:r>
+            <a:r>
+              <a:rPr lang="en-GB" sz="1400" dirty="0" err="1" smtClean="0">
+                <a:latin typeface="Inconsolata" panose="020B0609030003000000" pitchFamily="50" charset="0"/>
+              </a:rPr>
+              <a:t>interest:</a:t>
+            </a:r>
+            <a:r>
+              <a:rPr lang="en-GB" sz="1400" dirty="0" err="1" smtClean="0">
+                <a:solidFill>
+                  <a:schemeClr val="accent5">
+                    <a:lumMod val="50000"/>
+                  </a:schemeClr>
+                </a:solidFill>
+                <a:latin typeface="Inconsolata" panose="020B0609030003000000" pitchFamily="50" charset="0"/>
+              </a:rPr>
+              <a:t>decimal</a:t>
+            </a:r>
+            <a:r>
+              <a:rPr lang="en-GB" sz="1400" dirty="0" smtClean="0">
+                <a:latin typeface="Inconsolata" panose="020B0609030003000000" pitchFamily="50" charset="0"/>
+              </a:rPr>
+              <a:t>,</a:t>
+            </a:r>
+            <a:endParaRPr lang="de-CH" sz="1400" dirty="0" smtClean="0">
+              <a:latin typeface="Inconsolata" panose="020B0609030003000000" pitchFamily="50" charset="0"/>
+            </a:endParaRPr>
+          </a:p>
+          <a:p>
+            <a:pPr>
+              <a:lnSpc>
+                <a:spcPct val="100000"/>
+              </a:lnSpc>
+              <a:spcBef>
+                <a:spcPts val="0"/>
+              </a:spcBef>
+            </a:pPr>
+            <a:r>
+              <a:rPr lang="en-GB" sz="1400" dirty="0" smtClean="0">
+                <a:latin typeface="Inconsolata" panose="020B0609030003000000" pitchFamily="50" charset="0"/>
+              </a:rPr>
+              <a:t>	</a:t>
+            </a:r>
+            <a:r>
+              <a:rPr lang="en-GB" sz="1400" dirty="0" smtClean="0">
+                <a:solidFill>
+                  <a:schemeClr val="accent5">
+                    <a:lumMod val="50000"/>
+                  </a:schemeClr>
+                </a:solidFill>
+                <a:latin typeface="Inconsolata" panose="020B0609030003000000" pitchFamily="50" charset="0"/>
+              </a:rPr>
+              <a:t>in </a:t>
+            </a:r>
+            <a:r>
+              <a:rPr lang="en-GB" sz="1400" dirty="0" err="1" smtClean="0">
+                <a:solidFill>
+                  <a:schemeClr val="accent5">
+                    <a:lumMod val="50000"/>
+                  </a:schemeClr>
+                </a:solidFill>
+                <a:latin typeface="Inconsolata" panose="020B0609030003000000" pitchFamily="50" charset="0"/>
+              </a:rPr>
+              <a:t>const</a:t>
+            </a:r>
+            <a:r>
+              <a:rPr lang="en-GB" sz="1400" dirty="0" smtClean="0">
+                <a:solidFill>
+                  <a:schemeClr val="accent5">
+                    <a:lumMod val="50000"/>
+                  </a:schemeClr>
+                </a:solidFill>
+                <a:latin typeface="Inconsolata" panose="020B0609030003000000" pitchFamily="50" charset="0"/>
+              </a:rPr>
+              <a:t> </a:t>
+            </a:r>
+            <a:r>
+              <a:rPr lang="en-GB" sz="1400" dirty="0" smtClean="0">
+                <a:latin typeface="Inconsolata" panose="020B0609030003000000" pitchFamily="50" charset="0"/>
+              </a:rPr>
+              <a:t>years:</a:t>
+            </a:r>
+            <a:r>
+              <a:rPr lang="en-GB" sz="1400" dirty="0" smtClean="0">
+                <a:solidFill>
+                  <a:schemeClr val="accent5">
+                    <a:lumMod val="50000"/>
+                  </a:schemeClr>
+                </a:solidFill>
+                <a:latin typeface="Inconsolata" panose="020B0609030003000000" pitchFamily="50" charset="0"/>
+              </a:rPr>
+              <a:t>int32</a:t>
+            </a:r>
+            <a:r>
+              <a:rPr lang="en-GB" sz="1400" dirty="0" smtClean="0">
+                <a:latin typeface="Inconsolata" panose="020B0609030003000000" pitchFamily="50" charset="0"/>
+              </a:rPr>
+              <a:t>, </a:t>
+            </a:r>
+            <a:r>
+              <a:rPr lang="en-GB" sz="1400" dirty="0" smtClean="0">
+                <a:solidFill>
+                  <a:schemeClr val="accent5">
+                    <a:lumMod val="50000"/>
+                  </a:schemeClr>
+                </a:solidFill>
+                <a:latin typeface="Inconsolata" panose="020B0609030003000000" pitchFamily="50" charset="0"/>
+              </a:rPr>
+              <a:t>out </a:t>
+            </a:r>
+            <a:r>
+              <a:rPr lang="en-GB" sz="1400" dirty="0" err="1" smtClean="0">
+                <a:solidFill>
+                  <a:schemeClr val="accent5">
+                    <a:lumMod val="50000"/>
+                  </a:schemeClr>
+                </a:solidFill>
+                <a:latin typeface="Inconsolata" panose="020B0609030003000000" pitchFamily="50" charset="0"/>
+              </a:rPr>
+              <a:t>const</a:t>
+            </a:r>
+            <a:r>
+              <a:rPr lang="en-GB" sz="1400" dirty="0" smtClean="0">
+                <a:solidFill>
+                  <a:schemeClr val="accent5">
+                    <a:lumMod val="50000"/>
+                  </a:schemeClr>
+                </a:solidFill>
+                <a:latin typeface="Inconsolata" panose="020B0609030003000000" pitchFamily="50" charset="0"/>
+              </a:rPr>
+              <a:t> </a:t>
+            </a:r>
+            <a:r>
+              <a:rPr lang="en-GB" sz="1400" dirty="0" err="1" smtClean="0">
+                <a:latin typeface="Inconsolata" panose="020B0609030003000000" pitchFamily="50" charset="0"/>
+              </a:rPr>
+              <a:t>capitaln:</a:t>
+            </a:r>
+            <a:r>
+              <a:rPr lang="en-GB" sz="1400" dirty="0" err="1" smtClean="0">
+                <a:solidFill>
+                  <a:schemeClr val="accent5">
+                    <a:lumMod val="50000"/>
+                  </a:schemeClr>
+                </a:solidFill>
+                <a:latin typeface="Inconsolata" panose="020B0609030003000000" pitchFamily="50" charset="0"/>
+              </a:rPr>
+              <a:t>decimal</a:t>
+            </a:r>
+            <a:r>
+              <a:rPr lang="en-GB" sz="1400" dirty="0" smtClean="0">
+                <a:latin typeface="Inconsolata" panose="020B0609030003000000" pitchFamily="50" charset="0"/>
+              </a:rPr>
+              <a:t>)</a:t>
+            </a:r>
+            <a:endParaRPr lang="de-CH" sz="1400" dirty="0" smtClean="0">
+              <a:latin typeface="Inconsolata" panose="020B0609030003000000" pitchFamily="50" charset="0"/>
+            </a:endParaRPr>
+          </a:p>
+          <a:p>
+            <a:pPr>
+              <a:lnSpc>
+                <a:spcPct val="100000"/>
+              </a:lnSpc>
+              <a:spcBef>
+                <a:spcPts val="0"/>
+              </a:spcBef>
+            </a:pPr>
+            <a:r>
+              <a:rPr lang="en-GB" sz="1400" dirty="0" smtClean="0">
+                <a:solidFill>
+                  <a:schemeClr val="accent5">
+                    <a:lumMod val="50000"/>
+                  </a:schemeClr>
+                </a:solidFill>
+                <a:latin typeface="Inconsolata" panose="020B0609030003000000" pitchFamily="50" charset="0"/>
+              </a:rPr>
+              <a:t>global</a:t>
+            </a:r>
+            <a:endParaRPr lang="de-CH" sz="1400" dirty="0" smtClean="0">
+              <a:solidFill>
+                <a:schemeClr val="accent5">
+                  <a:lumMod val="50000"/>
+                </a:schemeClr>
+              </a:solidFill>
+              <a:latin typeface="Inconsolata" panose="020B0609030003000000" pitchFamily="50" charset="0"/>
+            </a:endParaRPr>
+          </a:p>
+          <a:p>
+            <a:pPr>
+              <a:lnSpc>
+                <a:spcPct val="100000"/>
+              </a:lnSpc>
+              <a:spcBef>
+                <a:spcPts val="0"/>
+              </a:spcBef>
+            </a:pPr>
+            <a:r>
+              <a:rPr lang="en-GB" sz="1400" dirty="0" smtClean="0">
+                <a:solidFill>
+                  <a:schemeClr val="accent5">
+                    <a:lumMod val="50000"/>
+                  </a:schemeClr>
+                </a:solidFill>
+                <a:latin typeface="Inconsolata" panose="020B0609030003000000" pitchFamily="50" charset="0"/>
+              </a:rPr>
+              <a:t>	</a:t>
+            </a:r>
+            <a:r>
+              <a:rPr lang="en-GB" sz="1400" dirty="0" err="1" smtClean="0">
+                <a:solidFill>
+                  <a:schemeClr val="accent5">
+                    <a:lumMod val="50000"/>
+                  </a:schemeClr>
+                </a:solidFill>
+                <a:latin typeface="Inconsolata" panose="020B0609030003000000" pitchFamily="50" charset="0"/>
+              </a:rPr>
+              <a:t>proc</a:t>
+            </a:r>
+            <a:r>
+              <a:rPr lang="en-GB" sz="1400" dirty="0" smtClean="0">
+                <a:solidFill>
+                  <a:schemeClr val="accent5">
+                    <a:lumMod val="50000"/>
+                  </a:schemeClr>
+                </a:solidFill>
+                <a:latin typeface="Inconsolata" panose="020B0609030003000000" pitchFamily="50" charset="0"/>
+              </a:rPr>
+              <a:t> </a:t>
+            </a:r>
+            <a:r>
+              <a:rPr lang="en-GB" sz="1400" dirty="0" smtClean="0">
+                <a:latin typeface="Inconsolata" panose="020B0609030003000000" pitchFamily="50" charset="0"/>
+              </a:rPr>
+              <a:t>pow(</a:t>
+            </a:r>
+            <a:r>
+              <a:rPr lang="en-GB" sz="1400" dirty="0" smtClean="0">
+                <a:solidFill>
+                  <a:schemeClr val="accent5">
+                    <a:lumMod val="50000"/>
+                  </a:schemeClr>
+                </a:solidFill>
+                <a:latin typeface="Inconsolata" panose="020B0609030003000000" pitchFamily="50" charset="0"/>
+              </a:rPr>
+              <a:t>in copy </a:t>
+            </a:r>
+            <a:r>
+              <a:rPr lang="en-GB" sz="1400" dirty="0" err="1" smtClean="0">
+                <a:solidFill>
+                  <a:schemeClr val="accent5">
+                    <a:lumMod val="50000"/>
+                  </a:schemeClr>
+                </a:solidFill>
+                <a:latin typeface="Inconsolata" panose="020B0609030003000000" pitchFamily="50" charset="0"/>
+              </a:rPr>
+              <a:t>const</a:t>
+            </a:r>
+            <a:r>
+              <a:rPr lang="en-GB" sz="1400" dirty="0" smtClean="0">
+                <a:latin typeface="Inconsolata" panose="020B0609030003000000" pitchFamily="50" charset="0"/>
+              </a:rPr>
+              <a:t> </a:t>
+            </a:r>
+            <a:r>
+              <a:rPr lang="en-GB" sz="1400" dirty="0" err="1" smtClean="0">
+                <a:latin typeface="Inconsolata" panose="020B0609030003000000" pitchFamily="50" charset="0"/>
+              </a:rPr>
+              <a:t>base:</a:t>
+            </a:r>
+            <a:r>
+              <a:rPr lang="en-GB" sz="1400" dirty="0" err="1" smtClean="0">
+                <a:solidFill>
+                  <a:schemeClr val="accent5">
+                    <a:lumMod val="50000"/>
+                  </a:schemeClr>
+                </a:solidFill>
+                <a:latin typeface="Inconsolata" panose="020B0609030003000000" pitchFamily="50" charset="0"/>
+              </a:rPr>
+              <a:t>decimal</a:t>
+            </a:r>
+            <a:r>
+              <a:rPr lang="en-GB" sz="1400" dirty="0" smtClean="0">
+                <a:latin typeface="Inconsolata" panose="020B0609030003000000" pitchFamily="50" charset="0"/>
+              </a:rPr>
+              <a:t>, </a:t>
+            </a:r>
+            <a:r>
+              <a:rPr lang="en-GB" sz="1400" dirty="0" smtClean="0">
+                <a:solidFill>
+                  <a:schemeClr val="accent5">
+                    <a:lumMod val="50000"/>
+                  </a:schemeClr>
+                </a:solidFill>
+                <a:latin typeface="Inconsolata" panose="020B0609030003000000" pitchFamily="50" charset="0"/>
+              </a:rPr>
+              <a:t>in copy </a:t>
+            </a:r>
+            <a:r>
+              <a:rPr lang="en-GB" sz="1400" dirty="0" err="1" smtClean="0">
+                <a:solidFill>
+                  <a:schemeClr val="accent5">
+                    <a:lumMod val="50000"/>
+                  </a:schemeClr>
+                </a:solidFill>
+                <a:latin typeface="Inconsolata" panose="020B0609030003000000" pitchFamily="50" charset="0"/>
+              </a:rPr>
+              <a:t>var</a:t>
+            </a:r>
+            <a:r>
+              <a:rPr lang="en-GB" sz="1400" dirty="0" smtClean="0">
+                <a:solidFill>
+                  <a:schemeClr val="accent5">
+                    <a:lumMod val="50000"/>
+                  </a:schemeClr>
+                </a:solidFill>
+                <a:latin typeface="Inconsolata" panose="020B0609030003000000" pitchFamily="50" charset="0"/>
+              </a:rPr>
+              <a:t> </a:t>
+            </a:r>
+            <a:r>
+              <a:rPr lang="en-GB" sz="1400" dirty="0" smtClean="0">
+                <a:latin typeface="Inconsolata" panose="020B0609030003000000" pitchFamily="50" charset="0"/>
+              </a:rPr>
+              <a:t>exp:</a:t>
+            </a:r>
+            <a:r>
+              <a:rPr lang="en-GB" sz="1400" dirty="0" smtClean="0">
+                <a:solidFill>
+                  <a:schemeClr val="accent5">
+                    <a:lumMod val="50000"/>
+                  </a:schemeClr>
+                </a:solidFill>
+                <a:latin typeface="Inconsolata" panose="020B0609030003000000" pitchFamily="50" charset="0"/>
+              </a:rPr>
+              <a:t>int32</a:t>
+            </a:r>
+            <a:r>
+              <a:rPr lang="en-GB" sz="1400" dirty="0" smtClean="0">
+                <a:latin typeface="Inconsolata" panose="020B0609030003000000" pitchFamily="50" charset="0"/>
+              </a:rPr>
+              <a:t>,</a:t>
+            </a:r>
+            <a:endParaRPr lang="de-CH" sz="1400" dirty="0" smtClean="0">
+              <a:latin typeface="Inconsolata" panose="020B0609030003000000" pitchFamily="50" charset="0"/>
+            </a:endParaRPr>
+          </a:p>
+          <a:p>
+            <a:pPr>
+              <a:lnSpc>
+                <a:spcPct val="100000"/>
+              </a:lnSpc>
+              <a:spcBef>
+                <a:spcPts val="0"/>
+              </a:spcBef>
+            </a:pPr>
+            <a:r>
+              <a:rPr lang="en-GB" sz="1400" dirty="0" smtClean="0">
+                <a:latin typeface="Inconsolata" panose="020B0609030003000000" pitchFamily="50" charset="0"/>
+              </a:rPr>
+              <a:t>		</a:t>
+            </a:r>
+            <a:r>
+              <a:rPr lang="en-GB" sz="1400" dirty="0" smtClean="0">
+                <a:solidFill>
+                  <a:schemeClr val="accent5">
+                    <a:lumMod val="50000"/>
+                  </a:schemeClr>
+                </a:solidFill>
+                <a:latin typeface="Inconsolata" panose="020B0609030003000000" pitchFamily="50" charset="0"/>
+              </a:rPr>
+              <a:t>out ref </a:t>
+            </a:r>
+            <a:r>
+              <a:rPr lang="en-GB" sz="1400" dirty="0" err="1" smtClean="0">
+                <a:solidFill>
+                  <a:schemeClr val="accent5">
+                    <a:lumMod val="50000"/>
+                  </a:schemeClr>
+                </a:solidFill>
+                <a:latin typeface="Inconsolata" panose="020B0609030003000000" pitchFamily="50" charset="0"/>
+              </a:rPr>
+              <a:t>var</a:t>
+            </a:r>
+            <a:r>
+              <a:rPr lang="en-GB" sz="1400" dirty="0" smtClean="0">
+                <a:solidFill>
+                  <a:schemeClr val="accent5">
+                    <a:lumMod val="50000"/>
+                  </a:schemeClr>
+                </a:solidFill>
+                <a:latin typeface="Inconsolata" panose="020B0609030003000000" pitchFamily="50" charset="0"/>
+              </a:rPr>
+              <a:t> </a:t>
+            </a:r>
+            <a:r>
+              <a:rPr lang="en-GB" sz="1400" dirty="0" smtClean="0">
+                <a:latin typeface="Inconsolata" panose="020B0609030003000000" pitchFamily="50" charset="0"/>
+              </a:rPr>
+              <a:t>o:</a:t>
+            </a:r>
+            <a:r>
+              <a:rPr lang="en-GB" sz="1400" dirty="0" smtClean="0">
+                <a:solidFill>
+                  <a:schemeClr val="accent5">
+                    <a:lumMod val="50000"/>
+                  </a:schemeClr>
+                </a:solidFill>
+                <a:latin typeface="Inconsolata" panose="020B0609030003000000" pitchFamily="50" charset="0"/>
+              </a:rPr>
+              <a:t>decimal</a:t>
+            </a:r>
+            <a:r>
+              <a:rPr lang="en-GB" sz="1400" dirty="0" smtClean="0">
+                <a:latin typeface="Inconsolata" panose="020B0609030003000000" pitchFamily="50" charset="0"/>
+              </a:rPr>
+              <a:t>)</a:t>
+            </a:r>
+            <a:endParaRPr lang="de-CH" sz="1400" dirty="0" smtClean="0">
+              <a:latin typeface="Inconsolata" panose="020B0609030003000000" pitchFamily="50" charset="0"/>
+            </a:endParaRPr>
+          </a:p>
+          <a:p>
+            <a:pPr>
+              <a:lnSpc>
+                <a:spcPct val="100000"/>
+              </a:lnSpc>
+              <a:spcBef>
+                <a:spcPts val="0"/>
+              </a:spcBef>
+            </a:pPr>
+            <a:r>
+              <a:rPr lang="en-GB" sz="1400" dirty="0" smtClean="0">
+                <a:latin typeface="Inconsolata" panose="020B0609030003000000" pitchFamily="50" charset="0"/>
+              </a:rPr>
+              <a:t>	</a:t>
+            </a:r>
+            <a:r>
+              <a:rPr lang="en-GB" sz="1400" dirty="0" smtClean="0">
+                <a:solidFill>
+                  <a:schemeClr val="accent5">
+                    <a:lumMod val="50000"/>
+                  </a:schemeClr>
+                </a:solidFill>
+                <a:latin typeface="Inconsolata" panose="020B0609030003000000" pitchFamily="50" charset="0"/>
+              </a:rPr>
+              <a:t>do</a:t>
+            </a:r>
+            <a:endParaRPr lang="de-CH" sz="1400" dirty="0" smtClean="0">
+              <a:solidFill>
+                <a:schemeClr val="accent5">
+                  <a:lumMod val="50000"/>
+                </a:schemeClr>
+              </a:solidFill>
+              <a:latin typeface="Inconsolata" panose="020B0609030003000000" pitchFamily="50" charset="0"/>
+            </a:endParaRPr>
+          </a:p>
+          <a:p>
+            <a:pPr>
+              <a:lnSpc>
+                <a:spcPct val="100000"/>
+              </a:lnSpc>
+              <a:spcBef>
+                <a:spcPts val="0"/>
+              </a:spcBef>
+            </a:pPr>
+            <a:r>
+              <a:rPr lang="en-GB" sz="1400" dirty="0" smtClean="0">
+                <a:latin typeface="Inconsolata" panose="020B0609030003000000" pitchFamily="50" charset="0"/>
+              </a:rPr>
+              <a:t>		o </a:t>
+            </a:r>
+            <a:r>
+              <a:rPr lang="en-GB" sz="1400" dirty="0" err="1" smtClean="0">
+                <a:solidFill>
+                  <a:schemeClr val="accent5">
+                    <a:lumMod val="50000"/>
+                  </a:schemeClr>
+                </a:solidFill>
+                <a:latin typeface="Inconsolata" panose="020B0609030003000000" pitchFamily="50" charset="0"/>
+              </a:rPr>
+              <a:t>init</a:t>
+            </a:r>
+            <a:r>
+              <a:rPr lang="en-GB" sz="1400" dirty="0" smtClean="0">
+                <a:latin typeface="Inconsolata" panose="020B0609030003000000" pitchFamily="50" charset="0"/>
+              </a:rPr>
+              <a:t> := 1.0m;</a:t>
+            </a:r>
+            <a:endParaRPr lang="de-CH" sz="1400" dirty="0" smtClean="0">
+              <a:latin typeface="Inconsolata" panose="020B0609030003000000" pitchFamily="50" charset="0"/>
+            </a:endParaRPr>
+          </a:p>
+          <a:p>
+            <a:pPr>
+              <a:lnSpc>
+                <a:spcPct val="100000"/>
+              </a:lnSpc>
+              <a:spcBef>
+                <a:spcPts val="0"/>
+              </a:spcBef>
+            </a:pPr>
+            <a:r>
+              <a:rPr lang="en-GB" sz="1400" dirty="0" smtClean="0">
+                <a:latin typeface="Inconsolata" panose="020B0609030003000000" pitchFamily="50" charset="0"/>
+              </a:rPr>
+              <a:t>		</a:t>
+            </a:r>
+            <a:r>
+              <a:rPr lang="en-GB" sz="1400" dirty="0" smtClean="0">
+                <a:solidFill>
+                  <a:schemeClr val="accent5">
+                    <a:lumMod val="50000"/>
+                  </a:schemeClr>
+                </a:solidFill>
+                <a:latin typeface="Inconsolata" panose="020B0609030003000000" pitchFamily="50" charset="0"/>
+              </a:rPr>
+              <a:t>while</a:t>
+            </a:r>
+            <a:r>
+              <a:rPr lang="en-GB" sz="1400" dirty="0" smtClean="0">
+                <a:latin typeface="Inconsolata" panose="020B0609030003000000" pitchFamily="50" charset="0"/>
+              </a:rPr>
+              <a:t> </a:t>
+            </a:r>
+            <a:r>
+              <a:rPr lang="en-GB" sz="1400" dirty="0" err="1" smtClean="0">
+                <a:latin typeface="Inconsolata" panose="020B0609030003000000" pitchFamily="50" charset="0"/>
+              </a:rPr>
+              <a:t>exp</a:t>
+            </a:r>
+            <a:r>
+              <a:rPr lang="en-GB" sz="1400" dirty="0" smtClean="0">
+                <a:latin typeface="Inconsolata" panose="020B0609030003000000" pitchFamily="50" charset="0"/>
+              </a:rPr>
+              <a:t> &gt; 0 </a:t>
+            </a:r>
+            <a:r>
+              <a:rPr lang="en-GB" sz="1400" dirty="0" smtClean="0">
+                <a:solidFill>
+                  <a:schemeClr val="accent5">
+                    <a:lumMod val="50000"/>
+                  </a:schemeClr>
+                </a:solidFill>
+                <a:latin typeface="Inconsolata" panose="020B0609030003000000" pitchFamily="50" charset="0"/>
+              </a:rPr>
+              <a:t>do</a:t>
+            </a:r>
+            <a:endParaRPr lang="de-CH" sz="1400" dirty="0" smtClean="0">
+              <a:solidFill>
+                <a:schemeClr val="accent5">
+                  <a:lumMod val="50000"/>
+                </a:schemeClr>
+              </a:solidFill>
+              <a:latin typeface="Inconsolata" panose="020B0609030003000000" pitchFamily="50" charset="0"/>
+            </a:endParaRPr>
+          </a:p>
+          <a:p>
+            <a:pPr>
+              <a:lnSpc>
+                <a:spcPct val="100000"/>
+              </a:lnSpc>
+              <a:spcBef>
+                <a:spcPts val="0"/>
+              </a:spcBef>
+            </a:pPr>
+            <a:r>
+              <a:rPr lang="en-GB" sz="1400" dirty="0" smtClean="0">
+                <a:latin typeface="Inconsolata" panose="020B0609030003000000" pitchFamily="50" charset="0"/>
+              </a:rPr>
+              <a:t>			o := o * base;</a:t>
+            </a:r>
+            <a:endParaRPr lang="de-CH" sz="1400" dirty="0" smtClean="0">
+              <a:latin typeface="Inconsolata" panose="020B0609030003000000" pitchFamily="50" charset="0"/>
+            </a:endParaRPr>
+          </a:p>
+          <a:p>
+            <a:pPr>
+              <a:lnSpc>
+                <a:spcPct val="100000"/>
+              </a:lnSpc>
+              <a:spcBef>
+                <a:spcPts val="0"/>
+              </a:spcBef>
+            </a:pPr>
+            <a:r>
+              <a:rPr lang="en-GB" sz="1400" dirty="0" smtClean="0">
+                <a:latin typeface="Inconsolata" panose="020B0609030003000000" pitchFamily="50" charset="0"/>
+              </a:rPr>
+              <a:t>			</a:t>
+            </a:r>
+            <a:r>
+              <a:rPr lang="en-GB" sz="1400" dirty="0" err="1" smtClean="0">
+                <a:latin typeface="Inconsolata" panose="020B0609030003000000" pitchFamily="50" charset="0"/>
+              </a:rPr>
+              <a:t>exp</a:t>
+            </a:r>
+            <a:r>
+              <a:rPr lang="en-GB" sz="1400" dirty="0" smtClean="0">
+                <a:latin typeface="Inconsolata" panose="020B0609030003000000" pitchFamily="50" charset="0"/>
+              </a:rPr>
+              <a:t> := </a:t>
+            </a:r>
+            <a:r>
+              <a:rPr lang="en-GB" sz="1400" dirty="0" err="1" smtClean="0">
+                <a:latin typeface="Inconsolata" panose="020B0609030003000000" pitchFamily="50" charset="0"/>
+              </a:rPr>
+              <a:t>exp</a:t>
+            </a:r>
+            <a:r>
+              <a:rPr lang="en-GB" sz="1400" dirty="0" smtClean="0">
+                <a:latin typeface="Inconsolata" panose="020B0609030003000000" pitchFamily="50" charset="0"/>
+              </a:rPr>
+              <a:t> - 1</a:t>
+            </a:r>
+            <a:endParaRPr lang="de-CH" sz="1400" dirty="0" smtClean="0">
+              <a:latin typeface="Inconsolata" panose="020B0609030003000000" pitchFamily="50" charset="0"/>
+            </a:endParaRPr>
+          </a:p>
+          <a:p>
+            <a:pPr>
+              <a:lnSpc>
+                <a:spcPct val="100000"/>
+              </a:lnSpc>
+              <a:spcBef>
+                <a:spcPts val="0"/>
+              </a:spcBef>
+            </a:pPr>
+            <a:r>
+              <a:rPr lang="en-GB" sz="1400" dirty="0" smtClean="0">
+                <a:latin typeface="Inconsolata" panose="020B0609030003000000" pitchFamily="50" charset="0"/>
+              </a:rPr>
+              <a:t>		</a:t>
+            </a:r>
+            <a:r>
+              <a:rPr lang="en-GB" sz="1400" dirty="0" err="1" smtClean="0">
+                <a:solidFill>
+                  <a:schemeClr val="accent5">
+                    <a:lumMod val="50000"/>
+                  </a:schemeClr>
+                </a:solidFill>
+                <a:latin typeface="Inconsolata" panose="020B0609030003000000" pitchFamily="50" charset="0"/>
+              </a:rPr>
+              <a:t>endwhile</a:t>
+            </a:r>
+            <a:endParaRPr lang="de-CH" sz="1400" dirty="0" smtClean="0">
+              <a:solidFill>
+                <a:schemeClr val="accent5">
+                  <a:lumMod val="50000"/>
+                </a:schemeClr>
+              </a:solidFill>
+              <a:latin typeface="Inconsolata" panose="020B0609030003000000" pitchFamily="50" charset="0"/>
+            </a:endParaRPr>
+          </a:p>
+          <a:p>
+            <a:pPr>
+              <a:lnSpc>
+                <a:spcPct val="100000"/>
+              </a:lnSpc>
+              <a:spcBef>
+                <a:spcPts val="0"/>
+              </a:spcBef>
+            </a:pPr>
+            <a:r>
+              <a:rPr lang="en-GB" sz="1400" dirty="0" smtClean="0">
+                <a:latin typeface="Inconsolata" panose="020B0609030003000000" pitchFamily="50" charset="0"/>
+              </a:rPr>
+              <a:t>	</a:t>
+            </a:r>
+            <a:r>
+              <a:rPr lang="en-GB" sz="1400" dirty="0" err="1" smtClean="0">
+                <a:solidFill>
+                  <a:schemeClr val="accent5">
+                    <a:lumMod val="50000"/>
+                  </a:schemeClr>
+                </a:solidFill>
+                <a:latin typeface="Inconsolata" panose="020B0609030003000000" pitchFamily="50" charset="0"/>
+              </a:rPr>
+              <a:t>endproc</a:t>
+            </a:r>
+            <a:r>
+              <a:rPr lang="en-GB" sz="1400" dirty="0" smtClean="0">
+                <a:latin typeface="Inconsolata" panose="020B0609030003000000" pitchFamily="50" charset="0"/>
+              </a:rPr>
+              <a:t>;</a:t>
+            </a:r>
+            <a:endParaRPr lang="de-CH" sz="1400" dirty="0" smtClean="0">
+              <a:latin typeface="Inconsolata" panose="020B0609030003000000" pitchFamily="50" charset="0"/>
+            </a:endParaRPr>
+          </a:p>
+          <a:p>
+            <a:pPr>
+              <a:lnSpc>
+                <a:spcPct val="100000"/>
+              </a:lnSpc>
+              <a:spcBef>
+                <a:spcPts val="0"/>
+              </a:spcBef>
+            </a:pPr>
+            <a:r>
+              <a:rPr lang="en-GB" sz="1400" dirty="0" smtClean="0">
+                <a:latin typeface="Inconsolata" panose="020B0609030003000000" pitchFamily="50" charset="0"/>
+              </a:rPr>
+              <a:t>	</a:t>
+            </a:r>
+            <a:r>
+              <a:rPr lang="en-GB" sz="1400" dirty="0" err="1" smtClean="0">
+                <a:solidFill>
+                  <a:schemeClr val="accent5">
+                    <a:lumMod val="50000"/>
+                  </a:schemeClr>
+                </a:solidFill>
+                <a:latin typeface="Inconsolata" panose="020B0609030003000000" pitchFamily="50" charset="0"/>
+              </a:rPr>
+              <a:t>var</a:t>
+            </a:r>
+            <a:r>
+              <a:rPr lang="en-GB" sz="1400" dirty="0" smtClean="0">
+                <a:solidFill>
+                  <a:schemeClr val="accent5">
+                    <a:lumMod val="50000"/>
+                  </a:schemeClr>
+                </a:solidFill>
+                <a:latin typeface="Inconsolata" panose="020B0609030003000000" pitchFamily="50" charset="0"/>
+              </a:rPr>
+              <a:t> </a:t>
+            </a:r>
+            <a:r>
+              <a:rPr lang="en-GB" sz="1400" dirty="0" err="1" smtClean="0">
+                <a:latin typeface="Inconsolata" panose="020B0609030003000000" pitchFamily="50" charset="0"/>
+              </a:rPr>
+              <a:t>ipown:</a:t>
+            </a:r>
+            <a:r>
+              <a:rPr lang="en-GB" sz="1400" dirty="0" err="1" smtClean="0">
+                <a:solidFill>
+                  <a:schemeClr val="accent5">
+                    <a:lumMod val="50000"/>
+                  </a:schemeClr>
+                </a:solidFill>
+                <a:latin typeface="Inconsolata" panose="020B0609030003000000" pitchFamily="50" charset="0"/>
+              </a:rPr>
+              <a:t>decimal</a:t>
+            </a:r>
+            <a:r>
+              <a:rPr lang="en-GB" sz="1400" dirty="0" smtClean="0">
+                <a:latin typeface="Inconsolata" panose="020B0609030003000000" pitchFamily="50" charset="0"/>
+              </a:rPr>
+              <a:t>; //pow(</a:t>
+            </a:r>
+            <a:r>
+              <a:rPr lang="en-GB" sz="1400" dirty="0" err="1" smtClean="0">
+                <a:latin typeface="Inconsolata" panose="020B0609030003000000" pitchFamily="50" charset="0"/>
+              </a:rPr>
+              <a:t>i</a:t>
+            </a:r>
+            <a:r>
+              <a:rPr lang="en-GB" sz="1400" dirty="0" smtClean="0">
+                <a:latin typeface="Inconsolata" panose="020B0609030003000000" pitchFamily="50" charset="0"/>
+              </a:rPr>
+              <a:t>, years)</a:t>
+            </a:r>
+            <a:endParaRPr lang="de-CH" sz="1400" dirty="0" smtClean="0">
+              <a:latin typeface="Inconsolata" panose="020B0609030003000000" pitchFamily="50" charset="0"/>
+            </a:endParaRPr>
+          </a:p>
+          <a:p>
+            <a:pPr>
+              <a:lnSpc>
+                <a:spcPct val="100000"/>
+              </a:lnSpc>
+              <a:spcBef>
+                <a:spcPts val="0"/>
+              </a:spcBef>
+            </a:pPr>
+            <a:r>
+              <a:rPr lang="en-GB" sz="1400" dirty="0" smtClean="0">
+                <a:latin typeface="Inconsolata" panose="020B0609030003000000" pitchFamily="50" charset="0"/>
+              </a:rPr>
+              <a:t>	</a:t>
+            </a:r>
+            <a:r>
+              <a:rPr lang="en-GB" sz="1400" dirty="0" err="1" smtClean="0">
+                <a:solidFill>
+                  <a:schemeClr val="accent5">
+                    <a:lumMod val="50000"/>
+                  </a:schemeClr>
+                </a:solidFill>
+                <a:latin typeface="Inconsolata" panose="020B0609030003000000" pitchFamily="50" charset="0"/>
+              </a:rPr>
+              <a:t>var</a:t>
+            </a:r>
+            <a:r>
+              <a:rPr lang="en-GB" sz="1400" dirty="0" smtClean="0">
+                <a:solidFill>
+                  <a:schemeClr val="accent5">
+                    <a:lumMod val="50000"/>
+                  </a:schemeClr>
+                </a:solidFill>
+                <a:latin typeface="Inconsolata" panose="020B0609030003000000" pitchFamily="50" charset="0"/>
+              </a:rPr>
+              <a:t> </a:t>
+            </a:r>
+            <a:r>
+              <a:rPr lang="en-GB" sz="1400" dirty="0" err="1" smtClean="0">
+                <a:latin typeface="Inconsolata" panose="020B0609030003000000" pitchFamily="50" charset="0"/>
+              </a:rPr>
+              <a:t>captialur:</a:t>
+            </a:r>
+            <a:r>
+              <a:rPr lang="en-GB" sz="1400" dirty="0" err="1" smtClean="0">
+                <a:solidFill>
+                  <a:schemeClr val="accent5">
+                    <a:lumMod val="50000"/>
+                  </a:schemeClr>
+                </a:solidFill>
+                <a:latin typeface="Inconsolata" panose="020B0609030003000000" pitchFamily="50" charset="0"/>
+              </a:rPr>
+              <a:t>decimal</a:t>
+            </a:r>
+            <a:r>
+              <a:rPr lang="en-GB" sz="1400" dirty="0" smtClean="0">
+                <a:latin typeface="Inconsolata" panose="020B0609030003000000" pitchFamily="50" charset="0"/>
+              </a:rPr>
+              <a:t> //Unrounded capital</a:t>
+            </a:r>
+            <a:endParaRPr lang="de-CH" sz="1400" dirty="0" smtClean="0">
+              <a:latin typeface="Inconsolata" panose="020B0609030003000000" pitchFamily="50" charset="0"/>
+            </a:endParaRPr>
+          </a:p>
+          <a:p>
+            <a:pPr>
+              <a:lnSpc>
+                <a:spcPct val="100000"/>
+              </a:lnSpc>
+              <a:spcBef>
+                <a:spcPts val="0"/>
+              </a:spcBef>
+            </a:pPr>
+            <a:r>
+              <a:rPr lang="en-GB" sz="1400" dirty="0" smtClean="0">
+                <a:solidFill>
+                  <a:schemeClr val="accent5">
+                    <a:lumMod val="50000"/>
+                  </a:schemeClr>
+                </a:solidFill>
+                <a:latin typeface="Inconsolata" panose="020B0609030003000000" pitchFamily="50" charset="0"/>
+              </a:rPr>
+              <a:t>do</a:t>
+            </a:r>
+            <a:endParaRPr lang="de-CH" sz="1400" dirty="0" smtClean="0">
+              <a:solidFill>
+                <a:schemeClr val="accent5">
+                  <a:lumMod val="50000"/>
+                </a:schemeClr>
+              </a:solidFill>
+              <a:latin typeface="Inconsolata" panose="020B0609030003000000" pitchFamily="50" charset="0"/>
+            </a:endParaRPr>
+          </a:p>
+          <a:p>
+            <a:pPr>
+              <a:lnSpc>
+                <a:spcPct val="100000"/>
+              </a:lnSpc>
+              <a:spcBef>
+                <a:spcPts val="0"/>
+              </a:spcBef>
+            </a:pPr>
+            <a:r>
+              <a:rPr lang="en-GB" sz="1400" dirty="0" smtClean="0">
+                <a:latin typeface="Inconsolata" panose="020B0609030003000000" pitchFamily="50" charset="0"/>
+              </a:rPr>
+              <a:t>	//Calculate interest</a:t>
+            </a:r>
+            <a:endParaRPr lang="de-CH" sz="1400" dirty="0" smtClean="0">
+              <a:latin typeface="Inconsolata" panose="020B0609030003000000" pitchFamily="50" charset="0"/>
+            </a:endParaRPr>
+          </a:p>
+          <a:p>
+            <a:pPr>
+              <a:lnSpc>
+                <a:spcPct val="100000"/>
+              </a:lnSpc>
+              <a:spcBef>
+                <a:spcPts val="0"/>
+              </a:spcBef>
+            </a:pPr>
+            <a:r>
+              <a:rPr lang="en-GB" sz="1400" dirty="0" smtClean="0">
+                <a:latin typeface="Inconsolata" panose="020B0609030003000000" pitchFamily="50" charset="0"/>
+              </a:rPr>
+              <a:t>	</a:t>
+            </a:r>
+            <a:r>
+              <a:rPr lang="en-GB" sz="1400" dirty="0" smtClean="0">
+                <a:solidFill>
+                  <a:schemeClr val="accent5">
+                    <a:lumMod val="50000"/>
+                  </a:schemeClr>
+                </a:solidFill>
+                <a:latin typeface="Inconsolata" panose="020B0609030003000000" pitchFamily="50" charset="0"/>
+              </a:rPr>
+              <a:t>call</a:t>
+            </a:r>
+            <a:r>
+              <a:rPr lang="en-GB" sz="1400" dirty="0" smtClean="0">
+                <a:latin typeface="Inconsolata" panose="020B0609030003000000" pitchFamily="50" charset="0"/>
+              </a:rPr>
+              <a:t> pow(1 + interest, years, </a:t>
+            </a:r>
+            <a:r>
+              <a:rPr lang="en-GB" sz="1400" dirty="0" err="1" smtClean="0">
+                <a:latin typeface="Inconsolata" panose="020B0609030003000000" pitchFamily="50" charset="0"/>
+              </a:rPr>
+              <a:t>ipown</a:t>
+            </a:r>
+            <a:r>
+              <a:rPr lang="en-GB" sz="1400" dirty="0" smtClean="0">
+                <a:latin typeface="Inconsolata" panose="020B0609030003000000" pitchFamily="50" charset="0"/>
+              </a:rPr>
+              <a:t> </a:t>
+            </a:r>
+            <a:r>
+              <a:rPr lang="en-GB" sz="1400" dirty="0" err="1" smtClean="0">
+                <a:solidFill>
+                  <a:schemeClr val="accent5">
+                    <a:lumMod val="50000"/>
+                  </a:schemeClr>
+                </a:solidFill>
+                <a:latin typeface="Inconsolata" panose="020B0609030003000000" pitchFamily="50" charset="0"/>
+              </a:rPr>
+              <a:t>init</a:t>
+            </a:r>
+            <a:r>
+              <a:rPr lang="en-GB" sz="1400" dirty="0" smtClean="0">
+                <a:latin typeface="Inconsolata" panose="020B0609030003000000" pitchFamily="50" charset="0"/>
+              </a:rPr>
+              <a:t>);</a:t>
+            </a:r>
+            <a:endParaRPr lang="de-CH" sz="1400" dirty="0" smtClean="0">
+              <a:latin typeface="Inconsolata" panose="020B0609030003000000" pitchFamily="50" charset="0"/>
+            </a:endParaRPr>
+          </a:p>
+          <a:p>
+            <a:pPr>
+              <a:lnSpc>
+                <a:spcPct val="100000"/>
+              </a:lnSpc>
+              <a:spcBef>
+                <a:spcPts val="0"/>
+              </a:spcBef>
+            </a:pPr>
+            <a:r>
+              <a:rPr lang="en-GB" sz="1400" dirty="0" smtClean="0">
+                <a:latin typeface="Inconsolata" panose="020B0609030003000000" pitchFamily="50" charset="0"/>
+              </a:rPr>
+              <a:t>	</a:t>
+            </a:r>
+            <a:r>
+              <a:rPr lang="en-GB" sz="1400" dirty="0" err="1" smtClean="0">
+                <a:latin typeface="Inconsolata" panose="020B0609030003000000" pitchFamily="50" charset="0"/>
+              </a:rPr>
+              <a:t>captialur</a:t>
+            </a:r>
+            <a:r>
+              <a:rPr lang="en-GB" sz="1400" dirty="0" smtClean="0">
+                <a:latin typeface="Inconsolata" panose="020B0609030003000000" pitchFamily="50" charset="0"/>
+              </a:rPr>
+              <a:t> := capital0 * </a:t>
+            </a:r>
+            <a:r>
+              <a:rPr lang="en-GB" sz="1400" dirty="0" err="1" smtClean="0">
+                <a:latin typeface="Inconsolata" panose="020B0609030003000000" pitchFamily="50" charset="0"/>
+              </a:rPr>
+              <a:t>ipown</a:t>
+            </a:r>
+            <a:r>
+              <a:rPr lang="en-GB" sz="1400" dirty="0" smtClean="0">
+                <a:latin typeface="Inconsolata" panose="020B0609030003000000" pitchFamily="50" charset="0"/>
+              </a:rPr>
+              <a:t>;</a:t>
+            </a:r>
+            <a:endParaRPr lang="de-CH" sz="1400" dirty="0" smtClean="0">
+              <a:latin typeface="Inconsolata" panose="020B0609030003000000" pitchFamily="50" charset="0"/>
+            </a:endParaRPr>
+          </a:p>
+          <a:p>
+            <a:pPr>
+              <a:lnSpc>
+                <a:spcPct val="100000"/>
+              </a:lnSpc>
+              <a:spcBef>
+                <a:spcPts val="0"/>
+              </a:spcBef>
+            </a:pPr>
+            <a:r>
+              <a:rPr lang="en-GB" sz="1400" dirty="0" smtClean="0">
+                <a:latin typeface="Inconsolata" panose="020B0609030003000000" pitchFamily="50" charset="0"/>
+              </a:rPr>
+              <a:t>	//Round to 5 centime (</a:t>
+            </a:r>
+            <a:r>
+              <a:rPr lang="en-GB" sz="1400" dirty="0" err="1" smtClean="0">
+                <a:latin typeface="Inconsolata" panose="020B0609030003000000" pitchFamily="50" charset="0"/>
+              </a:rPr>
+              <a:t>Rappen</a:t>
+            </a:r>
+            <a:r>
+              <a:rPr lang="en-GB" sz="1400" dirty="0" smtClean="0">
+                <a:latin typeface="Inconsolata" panose="020B0609030003000000" pitchFamily="50" charset="0"/>
+              </a:rPr>
+              <a:t>)</a:t>
+            </a:r>
+            <a:endParaRPr lang="de-CH" sz="1400" dirty="0" smtClean="0">
+              <a:latin typeface="Inconsolata" panose="020B0609030003000000" pitchFamily="50" charset="0"/>
+            </a:endParaRPr>
+          </a:p>
+          <a:p>
+            <a:pPr>
+              <a:lnSpc>
+                <a:spcPct val="100000"/>
+              </a:lnSpc>
+              <a:spcBef>
+                <a:spcPts val="0"/>
+              </a:spcBef>
+            </a:pPr>
+            <a:r>
+              <a:rPr lang="en-GB" sz="1400" dirty="0" smtClean="0">
+                <a:latin typeface="Inconsolata" panose="020B0609030003000000" pitchFamily="50" charset="0"/>
+              </a:rPr>
+              <a:t>	</a:t>
+            </a:r>
+            <a:r>
+              <a:rPr lang="en-GB" sz="1400" dirty="0" err="1" smtClean="0">
+                <a:latin typeface="Inconsolata" panose="020B0609030003000000" pitchFamily="50" charset="0"/>
+              </a:rPr>
+              <a:t>capitaln</a:t>
+            </a:r>
+            <a:r>
+              <a:rPr lang="en-GB" sz="1400" dirty="0" smtClean="0">
+                <a:latin typeface="Inconsolata" panose="020B0609030003000000" pitchFamily="50" charset="0"/>
+              </a:rPr>
+              <a:t> </a:t>
+            </a:r>
+            <a:r>
+              <a:rPr lang="en-GB" sz="1400" dirty="0" err="1" smtClean="0">
+                <a:solidFill>
+                  <a:schemeClr val="accent5">
+                    <a:lumMod val="50000"/>
+                  </a:schemeClr>
+                </a:solidFill>
+                <a:latin typeface="Inconsolata" panose="020B0609030003000000" pitchFamily="50" charset="0"/>
+              </a:rPr>
+              <a:t>init</a:t>
+            </a:r>
+            <a:r>
+              <a:rPr lang="en-GB" sz="1400" dirty="0" smtClean="0">
+                <a:solidFill>
+                  <a:schemeClr val="accent5">
+                    <a:lumMod val="50000"/>
+                  </a:schemeClr>
+                </a:solidFill>
+                <a:latin typeface="Inconsolata" panose="020B0609030003000000" pitchFamily="50" charset="0"/>
+              </a:rPr>
+              <a:t> </a:t>
+            </a:r>
+            <a:r>
+              <a:rPr lang="en-GB" sz="1400" dirty="0" smtClean="0">
+                <a:latin typeface="Inconsolata" panose="020B0609030003000000" pitchFamily="50" charset="0"/>
+              </a:rPr>
+              <a:t>:= </a:t>
+            </a:r>
+            <a:r>
+              <a:rPr lang="en-GB" sz="1400" dirty="0" smtClean="0">
+                <a:solidFill>
+                  <a:schemeClr val="accent5">
+                    <a:lumMod val="50000"/>
+                  </a:schemeClr>
+                </a:solidFill>
+                <a:latin typeface="Inconsolata" panose="020B0609030003000000" pitchFamily="50" charset="0"/>
+              </a:rPr>
+              <a:t>decimal</a:t>
+            </a:r>
+            <a:r>
+              <a:rPr lang="en-GB" sz="1400" dirty="0" smtClean="0">
+                <a:latin typeface="Inconsolata" panose="020B0609030003000000" pitchFamily="50" charset="0"/>
+              </a:rPr>
+              <a:t>(</a:t>
+            </a:r>
+            <a:r>
+              <a:rPr lang="en-GB" sz="1400" dirty="0" smtClean="0">
+                <a:solidFill>
+                  <a:schemeClr val="accent5">
+                    <a:lumMod val="50000"/>
+                  </a:schemeClr>
+                </a:solidFill>
+                <a:latin typeface="Inconsolata" panose="020B0609030003000000" pitchFamily="50" charset="0"/>
+              </a:rPr>
+              <a:t>int32</a:t>
+            </a:r>
+            <a:r>
+              <a:rPr lang="en-GB" sz="1400" dirty="0" smtClean="0">
+                <a:latin typeface="Inconsolata" panose="020B0609030003000000" pitchFamily="50" charset="0"/>
+              </a:rPr>
+              <a:t>(</a:t>
+            </a:r>
+            <a:r>
+              <a:rPr lang="en-GB" sz="1400" dirty="0" err="1" smtClean="0">
+                <a:latin typeface="Inconsolata" panose="020B0609030003000000" pitchFamily="50" charset="0"/>
+              </a:rPr>
+              <a:t>captialur</a:t>
+            </a:r>
+            <a:r>
+              <a:rPr lang="en-GB" sz="1400" dirty="0" smtClean="0">
+                <a:latin typeface="Inconsolata" panose="020B0609030003000000" pitchFamily="50" charset="0"/>
+              </a:rPr>
+              <a:t> * 20.0m)) </a:t>
+            </a:r>
+            <a:r>
+              <a:rPr lang="en-GB" sz="1400" dirty="0" smtClean="0">
+                <a:solidFill>
+                  <a:schemeClr val="accent5">
+                    <a:lumMod val="50000"/>
+                  </a:schemeClr>
+                </a:solidFill>
+                <a:latin typeface="Inconsolata" panose="020B0609030003000000" pitchFamily="50" charset="0"/>
+              </a:rPr>
+              <a:t>div</a:t>
+            </a:r>
+            <a:r>
+              <a:rPr lang="en-GB" sz="1400" dirty="0" smtClean="0">
+                <a:latin typeface="Inconsolata" panose="020B0609030003000000" pitchFamily="50" charset="0"/>
+              </a:rPr>
+              <a:t> 20.0m</a:t>
+            </a:r>
+            <a:endParaRPr lang="de-CH" sz="1400" dirty="0" smtClean="0">
+              <a:latin typeface="Inconsolata" panose="020B0609030003000000" pitchFamily="50" charset="0"/>
+            </a:endParaRPr>
+          </a:p>
+          <a:p>
+            <a:pPr>
+              <a:lnSpc>
+                <a:spcPct val="100000"/>
+              </a:lnSpc>
+              <a:spcBef>
+                <a:spcPts val="0"/>
+              </a:spcBef>
+            </a:pPr>
+            <a:r>
+              <a:rPr lang="en-GB" sz="1400" dirty="0" err="1" smtClean="0">
+                <a:solidFill>
+                  <a:schemeClr val="accent5">
+                    <a:lumMod val="50000"/>
+                  </a:schemeClr>
+                </a:solidFill>
+                <a:latin typeface="Inconsolata" panose="020B0609030003000000" pitchFamily="50" charset="0"/>
+              </a:rPr>
+              <a:t>endprogram</a:t>
+            </a:r>
+            <a:endParaRPr lang="de-CH" sz="1400" dirty="0">
+              <a:solidFill>
+                <a:schemeClr val="accent5">
+                  <a:lumMod val="50000"/>
+                </a:schemeClr>
+              </a:solidFill>
+              <a:latin typeface="Inconsolata" panose="020B0609030003000000" pitchFamily="50" charset="0"/>
+            </a:endParaRPr>
+          </a:p>
+        </p:txBody>
+      </p:sp>
+    </p:spTree>
+    <p:extLst>
+      <p:ext uri="{BB962C8B-B14F-4D97-AF65-F5344CB8AC3E}">
+        <p14:creationId xmlns:p14="http://schemas.microsoft.com/office/powerpoint/2010/main" val="3364658920"/>
+      </p:ext>
+    </p:extLst>
+  </p:cSld>
+  <p:clrMapOvr>
+    <a:masterClrMapping/>
+  </p:clrMapOvr>
+</p:sld>
+</file>
+
+<file path=ppt/slides/slide9.xml><?xml version="1.0" encoding="utf-8"?>
+<p:sld xmlns:a="http://schemas.openxmlformats.org/drawingml/2006/main" xmlns:r="http://schemas.openxmlformats.org/officeDocument/2006/relationships" xmlns:p="http://schemas.openxmlformats.org/presentationml/2006/main">
+  <p:cSld>
+    <p:spTree>
+      <p:nvGrpSpPr>
+        <p:cNvPr id="1" name=""/>
+        <p:cNvGrpSpPr/>
+        <p:nvPr/>
+      </p:nvGrpSpPr>
+      <p:grpSpPr>
+        <a:xfrm>
+          <a:off x="0" y="0"/>
+          <a:ext cx="0" cy="0"/>
+          <a:chOff x="0" y="0"/>
+          <a:chExt cx="0" cy="0"/>
+        </a:xfrm>
+      </p:grpSpPr>
+      <p:sp>
+        <p:nvSpPr>
+          <p:cNvPr id="2" name="Date Placeholder 1"/>
+          <p:cNvSpPr>
+            <a:spLocks noGrp="1"/>
+          </p:cNvSpPr>
+          <p:nvPr>
+            <p:ph type="dt" sz="half" idx="10"/>
+          </p:nvPr>
+        </p:nvSpPr>
+        <p:spPr/>
+        <p:txBody>
+          <a:bodyPr/>
+          <a:lstStyle/>
+          <a:p>
+            <a:fld id="{5E48492E-72D1-4785-9351-8AE1E40FBA2D}" type="datetime1">
+              <a:rPr lang="de-CH" smtClean="0">
+                <a:solidFill>
+                  <a:srgbClr val="000000"/>
+                </a:solidFill>
+              </a:rPr>
+              <a:t>16.11.2014</a:t>
+            </a:fld>
+            <a:endParaRPr lang="de-CH">
+              <a:solidFill>
+                <a:srgbClr val="000000"/>
+              </a:solidFill>
+            </a:endParaRPr>
+          </a:p>
+        </p:txBody>
+      </p:sp>
+      <p:sp>
+        <p:nvSpPr>
+          <p:cNvPr id="3" name="Footer Placeholder 2"/>
+          <p:cNvSpPr>
+            <a:spLocks noGrp="1"/>
+          </p:cNvSpPr>
+          <p:nvPr>
+            <p:ph type="ftr" sz="quarter" idx="11"/>
+          </p:nvPr>
+        </p:nvSpPr>
+        <p:spPr/>
+        <p:txBody>
+          <a:bodyPr/>
+          <a:lstStyle/>
+          <a:p>
+            <a:r>
+              <a:rPr lang="de-CH" dirty="0" err="1">
+                <a:solidFill>
+                  <a:srgbClr val="000000"/>
+                </a:solidFill>
+              </a:rPr>
+              <a:t>Decimal</a:t>
+            </a:r>
+            <a:r>
+              <a:rPr lang="de-CH" dirty="0">
+                <a:solidFill>
+                  <a:srgbClr val="000000"/>
+                </a:solidFill>
+              </a:rPr>
+              <a:t> in IML, Janis Peyer, Ralf Grubenmann</a:t>
+            </a:r>
+          </a:p>
+        </p:txBody>
+      </p:sp>
+      <p:sp>
+        <p:nvSpPr>
+          <p:cNvPr id="4" name="Slide Number Placeholder 3"/>
+          <p:cNvSpPr>
+            <a:spLocks noGrp="1"/>
+          </p:cNvSpPr>
+          <p:nvPr>
+            <p:ph type="sldNum" sz="quarter" idx="12"/>
+          </p:nvPr>
+        </p:nvSpPr>
+        <p:spPr/>
+        <p:txBody>
+          <a:bodyPr/>
+          <a:lstStyle/>
+          <a:p>
+            <a:fld id="{351188DD-6605-4EF4-9E67-B567F731CE68}" type="slidenum">
+              <a:rPr lang="de-CH" smtClean="0">
+                <a:solidFill>
+                  <a:srgbClr val="000000"/>
+                </a:solidFill>
+              </a:rPr>
+              <a:pPr/>
+              <a:t>9</a:t>
             </a:fld>
             <a:endParaRPr lang="de-CH">
               <a:solidFill>
@@ -8179,7 +9251,7 @@
         <a:effectLst/>
         <a:extLst>
           <a:ext uri="{AF507438-7753-43e0-B8FC-AC1667EBCBE1}">
-            <a14:hiddenEffects xmlns="" xmlns:a14="http://schemas.microsoft.com/office/drawing/2010/main">
+            <a14:hiddenEffects xmlns:a14="http://schemas.microsoft.com/office/drawing/2010/main" xmlns="">
               <a:effectLst>
                 <a:outerShdw dist="35921" dir="2700000" algn="ctr" rotWithShape="0">
                   <a:schemeClr val="bg2"/>
@@ -8252,7 +9324,7 @@
         <a:effectLst/>
         <a:extLst>
           <a:ext uri="{AF507438-7753-43e0-B8FC-AC1667EBCBE1}">
-            <a14:hiddenEffects xmlns="" xmlns:a14="http://schemas.microsoft.com/office/drawing/2010/main">
+            <a14:hiddenEffects xmlns:a14="http://schemas.microsoft.com/office/drawing/2010/main" xmlns="">
               <a:effectLst>
                 <a:outerShdw dist="35921" dir="2700000" algn="ctr" rotWithShape="0">
                   <a:schemeClr val="bg2"/>

</xml_diff>